<commit_message>
Changed body text color to black
</commit_message>
<xml_diff>
--- a/Pitch/PITCH.pptx
+++ b/Pitch/PITCH.pptx
@@ -4996,8 +4996,16 @@
         <a:lstStyle/>
         <a:p>
           <a:r>
+            <a:rPr lang="en-US" dirty="0">
+              <a:solidFill>
+                <a:srgbClr val="2E2B21"/>
+              </a:solidFill>
+            </a:rPr>
+            <a:t>Multiplayer</a:t>
+          </a:r>
+          <a:r>
             <a:rPr lang="en-US" dirty="0"/>
-            <a:t>Multiplayer competitiv</a:t>
+            <a:t> competitiv</a:t>
           </a:r>
           <a:r>
             <a:rPr lang="it-IT" dirty="0"/>
@@ -5274,10 +5282,18 @@
         <a:lstStyle/>
         <a:p>
           <a:r>
-            <a:rPr lang="it-IT" sz="1800"/>
+            <a:rPr lang="it-IT" sz="1800">
+              <a:solidFill>
+                <a:schemeClr val="tx1"/>
+              </a:solidFill>
+            </a:rPr>
             <a:t>Network</a:t>
           </a:r>
-          <a:endParaRPr lang="en-US" sz="1800"/>
+          <a:endParaRPr lang="en-US" sz="1800">
+            <a:solidFill>
+              <a:schemeClr val="tx1"/>
+            </a:solidFill>
+          </a:endParaRPr>
         </a:p>
       </dgm:t>
     </dgm:pt>
@@ -5288,7 +5304,11 @@
         <a:bodyPr/>
         <a:lstStyle/>
         <a:p>
-          <a:endParaRPr lang="en-US" sz="2400"/>
+          <a:endParaRPr lang="en-US" sz="2400">
+            <a:solidFill>
+              <a:schemeClr val="tx1"/>
+            </a:solidFill>
+          </a:endParaRPr>
         </a:p>
       </dgm:t>
     </dgm:pt>
@@ -5299,7 +5319,11 @@
         <a:bodyPr/>
         <a:lstStyle/>
         <a:p>
-          <a:endParaRPr lang="en-US" sz="4400"/>
+          <a:endParaRPr lang="en-US" sz="4400">
+            <a:solidFill>
+              <a:schemeClr val="tx1"/>
+            </a:solidFill>
+          </a:endParaRPr>
         </a:p>
       </dgm:t>
     </dgm:pt>
@@ -5311,10 +5335,18 @@
         <a:lstStyle/>
         <a:p>
           <a:r>
-            <a:rPr lang="it-IT" sz="1800" dirty="0"/>
+            <a:rPr lang="it-IT" sz="1800" dirty="0">
+              <a:solidFill>
+                <a:schemeClr val="tx1"/>
+              </a:solidFill>
+            </a:rPr>
             <a:t>Motore fisico JLiquidFun</a:t>
           </a:r>
-          <a:endParaRPr lang="en-US" sz="1800" dirty="0"/>
+          <a:endParaRPr lang="en-US" sz="1800" dirty="0">
+            <a:solidFill>
+              <a:schemeClr val="tx1"/>
+            </a:solidFill>
+          </a:endParaRPr>
         </a:p>
       </dgm:t>
     </dgm:pt>
@@ -5325,7 +5357,11 @@
         <a:bodyPr/>
         <a:lstStyle/>
         <a:p>
-          <a:endParaRPr lang="en-US" sz="2400"/>
+          <a:endParaRPr lang="en-US" sz="2400">
+            <a:solidFill>
+              <a:schemeClr val="tx1"/>
+            </a:solidFill>
+          </a:endParaRPr>
         </a:p>
       </dgm:t>
     </dgm:pt>
@@ -5336,7 +5372,11 @@
         <a:bodyPr/>
         <a:lstStyle/>
         <a:p>
-          <a:endParaRPr lang="en-US" sz="4400"/>
+          <a:endParaRPr lang="en-US" sz="4400">
+            <a:solidFill>
+              <a:schemeClr val="tx1"/>
+            </a:solidFill>
+          </a:endParaRPr>
         </a:p>
       </dgm:t>
     </dgm:pt>
@@ -5348,10 +5388,18 @@
         <a:lstStyle/>
         <a:p>
           <a:r>
-            <a:rPr lang="it-IT" sz="1800" dirty="0"/>
+            <a:rPr lang="it-IT" sz="1800" dirty="0">
+              <a:solidFill>
+                <a:schemeClr val="tx1"/>
+              </a:solidFill>
+            </a:rPr>
             <a:t>Render grafico Canvas</a:t>
           </a:r>
-          <a:endParaRPr lang="en-US" sz="1800" dirty="0"/>
+          <a:endParaRPr lang="en-US" sz="1800" dirty="0">
+            <a:solidFill>
+              <a:schemeClr val="tx1"/>
+            </a:solidFill>
+          </a:endParaRPr>
         </a:p>
       </dgm:t>
     </dgm:pt>
@@ -5362,7 +5410,11 @@
         <a:bodyPr/>
         <a:lstStyle/>
         <a:p>
-          <a:endParaRPr lang="en-US" sz="2400"/>
+          <a:endParaRPr lang="en-US" sz="2400">
+            <a:solidFill>
+              <a:schemeClr val="tx1"/>
+            </a:solidFill>
+          </a:endParaRPr>
         </a:p>
       </dgm:t>
     </dgm:pt>
@@ -5373,7 +5425,11 @@
         <a:bodyPr/>
         <a:lstStyle/>
         <a:p>
-          <a:endParaRPr lang="en-US" sz="4400"/>
+          <a:endParaRPr lang="en-US" sz="4400">
+            <a:solidFill>
+              <a:schemeClr val="tx1"/>
+            </a:solidFill>
+          </a:endParaRPr>
         </a:p>
       </dgm:t>
     </dgm:pt>
@@ -5784,17 +5840,33 @@
         <a:lstStyle/>
         <a:p>
           <a:r>
-            <a:rPr lang="it-IT" dirty="0"/>
+            <a:rPr lang="it-IT" dirty="0">
+              <a:solidFill>
+                <a:schemeClr val="tx1"/>
+              </a:solidFill>
+            </a:rPr>
             <a:t>Power-up</a:t>
           </a:r>
           <a:br>
-            <a:rPr lang="it-IT" dirty="0"/>
+            <a:rPr lang="it-IT" dirty="0">
+              <a:solidFill>
+                <a:schemeClr val="tx1"/>
+              </a:solidFill>
+            </a:rPr>
           </a:br>
           <a:r>
-            <a:rPr lang="it-IT" dirty="0"/>
+            <a:rPr lang="it-IT" dirty="0">
+              <a:solidFill>
+                <a:schemeClr val="tx1"/>
+              </a:solidFill>
+            </a:rPr>
             <a:t>(immagini sample?)</a:t>
           </a:r>
-          <a:endParaRPr lang="en-US" dirty="0"/>
+          <a:endParaRPr lang="en-US" dirty="0">
+            <a:solidFill>
+              <a:schemeClr val="tx1"/>
+            </a:solidFill>
+          </a:endParaRPr>
         </a:p>
       </dgm:t>
     </dgm:pt>
@@ -5805,7 +5877,11 @@
         <a:bodyPr/>
         <a:lstStyle/>
         <a:p>
-          <a:endParaRPr lang="en-US"/>
+          <a:endParaRPr lang="en-US">
+            <a:solidFill>
+              <a:schemeClr val="tx1"/>
+            </a:solidFill>
+          </a:endParaRPr>
         </a:p>
       </dgm:t>
     </dgm:pt>
@@ -5816,7 +5892,11 @@
         <a:bodyPr/>
         <a:lstStyle/>
         <a:p>
-          <a:endParaRPr lang="en-US"/>
+          <a:endParaRPr lang="en-US">
+            <a:solidFill>
+              <a:schemeClr val="tx1"/>
+            </a:solidFill>
+          </a:endParaRPr>
         </a:p>
       </dgm:t>
     </dgm:pt>
@@ -5828,10 +5908,18 @@
         <a:lstStyle/>
         <a:p>
           <a:r>
-            <a:rPr lang="it-IT"/>
+            <a:rPr lang="it-IT">
+              <a:solidFill>
+                <a:schemeClr val="tx1"/>
+              </a:solidFill>
+            </a:rPr>
             <a:t>Ridimensionamento del personaggio</a:t>
           </a:r>
-          <a:endParaRPr lang="en-US"/>
+          <a:endParaRPr lang="en-US">
+            <a:solidFill>
+              <a:schemeClr val="tx1"/>
+            </a:solidFill>
+          </a:endParaRPr>
         </a:p>
       </dgm:t>
     </dgm:pt>
@@ -5842,7 +5930,11 @@
         <a:bodyPr/>
         <a:lstStyle/>
         <a:p>
-          <a:endParaRPr lang="en-US"/>
+          <a:endParaRPr lang="en-US">
+            <a:solidFill>
+              <a:schemeClr val="tx1"/>
+            </a:solidFill>
+          </a:endParaRPr>
         </a:p>
       </dgm:t>
     </dgm:pt>
@@ -5853,7 +5945,11 @@
         <a:bodyPr/>
         <a:lstStyle/>
         <a:p>
-          <a:endParaRPr lang="en-US"/>
+          <a:endParaRPr lang="en-US">
+            <a:solidFill>
+              <a:schemeClr val="tx1"/>
+            </a:solidFill>
+          </a:endParaRPr>
         </a:p>
       </dgm:t>
     </dgm:pt>
@@ -5865,10 +5961,18 @@
         <a:lstStyle/>
         <a:p>
           <a:r>
-            <a:rPr lang="it-IT"/>
+            <a:rPr lang="it-IT">
+              <a:solidFill>
+                <a:schemeClr val="tx1"/>
+              </a:solidFill>
+            </a:rPr>
             <a:t>Cambio di velocità</a:t>
           </a:r>
-          <a:endParaRPr lang="en-US"/>
+          <a:endParaRPr lang="en-US">
+            <a:solidFill>
+              <a:schemeClr val="tx1"/>
+            </a:solidFill>
+          </a:endParaRPr>
         </a:p>
       </dgm:t>
     </dgm:pt>
@@ -5879,7 +5983,11 @@
         <a:bodyPr/>
         <a:lstStyle/>
         <a:p>
-          <a:endParaRPr lang="en-US"/>
+          <a:endParaRPr lang="en-US">
+            <a:solidFill>
+              <a:schemeClr val="tx1"/>
+            </a:solidFill>
+          </a:endParaRPr>
         </a:p>
       </dgm:t>
     </dgm:pt>
@@ -5890,7 +5998,11 @@
         <a:bodyPr/>
         <a:lstStyle/>
         <a:p>
-          <a:endParaRPr lang="en-US"/>
+          <a:endParaRPr lang="en-US">
+            <a:solidFill>
+              <a:schemeClr val="tx1"/>
+            </a:solidFill>
+          </a:endParaRPr>
         </a:p>
       </dgm:t>
     </dgm:pt>
@@ -5902,10 +6014,18 @@
         <a:lstStyle/>
         <a:p>
           <a:r>
-            <a:rPr lang="it-IT"/>
+            <a:rPr lang="it-IT">
+              <a:solidFill>
+                <a:schemeClr val="tx1"/>
+              </a:solidFill>
+            </a:rPr>
             <a:t>Armi</a:t>
           </a:r>
-          <a:endParaRPr lang="en-US"/>
+          <a:endParaRPr lang="en-US">
+            <a:solidFill>
+              <a:schemeClr val="tx1"/>
+            </a:solidFill>
+          </a:endParaRPr>
         </a:p>
       </dgm:t>
     </dgm:pt>
@@ -5916,7 +6036,11 @@
         <a:bodyPr/>
         <a:lstStyle/>
         <a:p>
-          <a:endParaRPr lang="en-US"/>
+          <a:endParaRPr lang="en-US">
+            <a:solidFill>
+              <a:schemeClr val="tx1"/>
+            </a:solidFill>
+          </a:endParaRPr>
         </a:p>
       </dgm:t>
     </dgm:pt>
@@ -5927,7 +6051,11 @@
         <a:bodyPr/>
         <a:lstStyle/>
         <a:p>
-          <a:endParaRPr lang="en-US"/>
+          <a:endParaRPr lang="en-US">
+            <a:solidFill>
+              <a:schemeClr val="tx1"/>
+            </a:solidFill>
+          </a:endParaRPr>
         </a:p>
       </dgm:t>
     </dgm:pt>
@@ -5939,25 +6067,49 @@
         <a:lstStyle/>
         <a:p>
           <a:r>
-            <a:rPr lang="it-IT" dirty="0"/>
+            <a:rPr lang="it-IT" dirty="0">
+              <a:solidFill>
+                <a:schemeClr val="tx1"/>
+              </a:solidFill>
+            </a:rPr>
             <a:t>Diverse mappe</a:t>
           </a:r>
           <a:br>
-            <a:rPr lang="it-IT" dirty="0"/>
+            <a:rPr lang="it-IT" dirty="0">
+              <a:solidFill>
+                <a:schemeClr val="tx1"/>
+              </a:solidFill>
+            </a:rPr>
           </a:br>
           <a:r>
-            <a:rPr lang="it-IT" dirty="0"/>
+            <a:rPr lang="it-IT" dirty="0">
+              <a:solidFill>
+                <a:schemeClr val="tx1"/>
+              </a:solidFill>
+            </a:rPr>
             <a:t>(</a:t>
           </a:r>
           <a:r>
-            <a:rPr lang="it-IT" dirty="0" err="1"/>
+            <a:rPr lang="it-IT" dirty="0" err="1">
+              <a:solidFill>
+                <a:schemeClr val="tx1"/>
+              </a:solidFill>
+            </a:rPr>
             <a:t>parsing</a:t>
           </a:r>
           <a:r>
-            <a:rPr lang="it-IT" dirty="0"/>
+            <a:rPr lang="it-IT" dirty="0">
+              <a:solidFill>
+                <a:schemeClr val="tx1"/>
+              </a:solidFill>
+            </a:rPr>
             <a:t>?)</a:t>
           </a:r>
-          <a:endParaRPr lang="en-US" dirty="0"/>
+          <a:endParaRPr lang="en-US" dirty="0">
+            <a:solidFill>
+              <a:schemeClr val="tx1"/>
+            </a:solidFill>
+          </a:endParaRPr>
         </a:p>
       </dgm:t>
     </dgm:pt>
@@ -5968,7 +6120,11 @@
         <a:bodyPr/>
         <a:lstStyle/>
         <a:p>
-          <a:endParaRPr lang="en-US"/>
+          <a:endParaRPr lang="en-US">
+            <a:solidFill>
+              <a:schemeClr val="tx1"/>
+            </a:solidFill>
+          </a:endParaRPr>
         </a:p>
       </dgm:t>
     </dgm:pt>
@@ -5979,7 +6135,11 @@
         <a:bodyPr/>
         <a:lstStyle/>
         <a:p>
-          <a:endParaRPr lang="en-US"/>
+          <a:endParaRPr lang="en-US">
+            <a:solidFill>
+              <a:schemeClr val="tx1"/>
+            </a:solidFill>
+          </a:endParaRPr>
         </a:p>
       </dgm:t>
     </dgm:pt>
@@ -5991,10 +6151,18 @@
         <a:lstStyle/>
         <a:p>
           <a:r>
-            <a:rPr lang="it-IT"/>
+            <a:rPr lang="it-IT">
+              <a:solidFill>
+                <a:schemeClr val="tx1"/>
+              </a:solidFill>
+            </a:rPr>
             <a:t>Gravità</a:t>
           </a:r>
-          <a:endParaRPr lang="en-US"/>
+          <a:endParaRPr lang="en-US">
+            <a:solidFill>
+              <a:schemeClr val="tx1"/>
+            </a:solidFill>
+          </a:endParaRPr>
         </a:p>
       </dgm:t>
     </dgm:pt>
@@ -6005,7 +6173,11 @@
         <a:bodyPr/>
         <a:lstStyle/>
         <a:p>
-          <a:endParaRPr lang="en-US"/>
+          <a:endParaRPr lang="en-US">
+            <a:solidFill>
+              <a:schemeClr val="tx1"/>
+            </a:solidFill>
+          </a:endParaRPr>
         </a:p>
       </dgm:t>
     </dgm:pt>
@@ -6016,7 +6188,11 @@
         <a:bodyPr/>
         <a:lstStyle/>
         <a:p>
-          <a:endParaRPr lang="en-US"/>
+          <a:endParaRPr lang="en-US">
+            <a:solidFill>
+              <a:schemeClr val="tx1"/>
+            </a:solidFill>
+          </a:endParaRPr>
         </a:p>
       </dgm:t>
     </dgm:pt>
@@ -6028,10 +6204,18 @@
         <a:lstStyle/>
         <a:p>
           <a:r>
-            <a:rPr lang="it-IT"/>
+            <a:rPr lang="it-IT">
+              <a:solidFill>
+                <a:schemeClr val="tx1"/>
+              </a:solidFill>
+            </a:rPr>
             <a:t>Buchi(?) all’interno dell’arena</a:t>
           </a:r>
-          <a:endParaRPr lang="en-US"/>
+          <a:endParaRPr lang="en-US">
+            <a:solidFill>
+              <a:schemeClr val="tx1"/>
+            </a:solidFill>
+          </a:endParaRPr>
         </a:p>
       </dgm:t>
     </dgm:pt>
@@ -6042,7 +6226,11 @@
         <a:bodyPr/>
         <a:lstStyle/>
         <a:p>
-          <a:endParaRPr lang="en-US"/>
+          <a:endParaRPr lang="en-US">
+            <a:solidFill>
+              <a:schemeClr val="tx1"/>
+            </a:solidFill>
+          </a:endParaRPr>
         </a:p>
       </dgm:t>
     </dgm:pt>
@@ -6053,7 +6241,11 @@
         <a:bodyPr/>
         <a:lstStyle/>
         <a:p>
-          <a:endParaRPr lang="en-US"/>
+          <a:endParaRPr lang="en-US">
+            <a:solidFill>
+              <a:schemeClr val="tx1"/>
+            </a:solidFill>
+          </a:endParaRPr>
         </a:p>
       </dgm:t>
     </dgm:pt>
@@ -6305,17 +6497,40 @@
       </dgm:t>
     </dgm:pt>
     <dgm:pt modelId="{38741C01-7851-42BE-87DC-D3978DB2949C}">
-      <dgm:prSet/>
+      <dgm:prSet>
+        <dgm:style>
+          <a:lnRef idx="1">
+            <a:schemeClr val="accent2"/>
+          </a:lnRef>
+          <a:fillRef idx="3">
+            <a:schemeClr val="accent2"/>
+          </a:fillRef>
+          <a:effectRef idx="2">
+            <a:schemeClr val="accent2"/>
+          </a:effectRef>
+          <a:fontRef idx="minor">
+            <a:schemeClr val="lt1"/>
+          </a:fontRef>
+        </dgm:style>
+      </dgm:prSet>
       <dgm:spPr/>
       <dgm:t>
         <a:bodyPr/>
         <a:lstStyle/>
         <a:p>
           <a:r>
-            <a:rPr lang="it-IT" dirty="0"/>
+            <a:rPr lang="it-IT" dirty="0">
+              <a:solidFill>
+                <a:schemeClr val="tx1"/>
+              </a:solidFill>
+            </a:rPr>
             <a:t>GRAFICA</a:t>
           </a:r>
-          <a:endParaRPr lang="en-US" dirty="0"/>
+          <a:endParaRPr lang="en-US" dirty="0">
+            <a:solidFill>
+              <a:schemeClr val="tx1"/>
+            </a:solidFill>
+          </a:endParaRPr>
         </a:p>
       </dgm:t>
     </dgm:pt>
@@ -6326,7 +6541,11 @@
         <a:bodyPr/>
         <a:lstStyle/>
         <a:p>
-          <a:endParaRPr lang="en-US"/>
+          <a:endParaRPr lang="en-US">
+            <a:solidFill>
+              <a:schemeClr val="tx1"/>
+            </a:solidFill>
+          </a:endParaRPr>
         </a:p>
       </dgm:t>
     </dgm:pt>
@@ -6337,22 +6556,49 @@
         <a:bodyPr/>
         <a:lstStyle/>
         <a:p>
-          <a:endParaRPr lang="en-US"/>
+          <a:endParaRPr lang="en-US">
+            <a:solidFill>
+              <a:schemeClr val="tx1"/>
+            </a:solidFill>
+          </a:endParaRPr>
         </a:p>
       </dgm:t>
     </dgm:pt>
     <dgm:pt modelId="{E651F29D-8135-4A76-862C-D9B25D85C42B}">
-      <dgm:prSet/>
+      <dgm:prSet>
+        <dgm:style>
+          <a:lnRef idx="3">
+            <a:schemeClr val="lt1"/>
+          </a:lnRef>
+          <a:fillRef idx="1">
+            <a:schemeClr val="accent4"/>
+          </a:fillRef>
+          <a:effectRef idx="1">
+            <a:schemeClr val="accent4"/>
+          </a:effectRef>
+          <a:fontRef idx="minor">
+            <a:schemeClr val="lt1"/>
+          </a:fontRef>
+        </dgm:style>
+      </dgm:prSet>
       <dgm:spPr/>
       <dgm:t>
         <a:bodyPr/>
         <a:lstStyle/>
         <a:p>
           <a:r>
-            <a:rPr lang="it-IT"/>
+            <a:rPr lang="it-IT">
+              <a:solidFill>
+                <a:schemeClr val="tx1"/>
+              </a:solidFill>
+            </a:rPr>
             <a:t>Bird’s eye view</a:t>
           </a:r>
-          <a:endParaRPr lang="en-US"/>
+          <a:endParaRPr lang="en-US">
+            <a:solidFill>
+              <a:schemeClr val="tx1"/>
+            </a:solidFill>
+          </a:endParaRPr>
         </a:p>
       </dgm:t>
     </dgm:pt>
@@ -6363,7 +6609,11 @@
         <a:bodyPr/>
         <a:lstStyle/>
         <a:p>
-          <a:endParaRPr lang="en-US"/>
+          <a:endParaRPr lang="en-US">
+            <a:solidFill>
+              <a:schemeClr val="tx1"/>
+            </a:solidFill>
+          </a:endParaRPr>
         </a:p>
       </dgm:t>
     </dgm:pt>
@@ -6374,19 +6624,42 @@
         <a:bodyPr/>
         <a:lstStyle/>
         <a:p>
-          <a:endParaRPr lang="en-US"/>
+          <a:endParaRPr lang="en-US">
+            <a:solidFill>
+              <a:schemeClr val="tx1"/>
+            </a:solidFill>
+          </a:endParaRPr>
         </a:p>
       </dgm:t>
     </dgm:pt>
     <dgm:pt modelId="{C1F0885D-5AEF-473C-A6C6-22B5A865203D}">
-      <dgm:prSet/>
+      <dgm:prSet>
+        <dgm:style>
+          <a:lnRef idx="1">
+            <a:schemeClr val="accent2"/>
+          </a:lnRef>
+          <a:fillRef idx="3">
+            <a:schemeClr val="accent2"/>
+          </a:fillRef>
+          <a:effectRef idx="2">
+            <a:schemeClr val="accent2"/>
+          </a:effectRef>
+          <a:fontRef idx="minor">
+            <a:schemeClr val="lt1"/>
+          </a:fontRef>
+        </dgm:style>
+      </dgm:prSet>
       <dgm:spPr/>
       <dgm:t>
         <a:bodyPr/>
         <a:lstStyle/>
         <a:p>
           <a:r>
-            <a:rPr lang="en-US" dirty="0"/>
+            <a:rPr lang="en-US" dirty="0">
+              <a:solidFill>
+                <a:schemeClr val="tx1"/>
+              </a:solidFill>
+            </a:rPr>
             <a:t>SONORO</a:t>
           </a:r>
         </a:p>
@@ -6399,7 +6672,11 @@
         <a:bodyPr/>
         <a:lstStyle/>
         <a:p>
-          <a:endParaRPr lang="en-US"/>
+          <a:endParaRPr lang="en-US">
+            <a:solidFill>
+              <a:schemeClr val="tx1"/>
+            </a:solidFill>
+          </a:endParaRPr>
         </a:p>
       </dgm:t>
     </dgm:pt>
@@ -6410,22 +6687,49 @@
         <a:bodyPr/>
         <a:lstStyle/>
         <a:p>
-          <a:endParaRPr lang="en-US"/>
+          <a:endParaRPr lang="en-US">
+            <a:solidFill>
+              <a:schemeClr val="tx1"/>
+            </a:solidFill>
+          </a:endParaRPr>
         </a:p>
       </dgm:t>
     </dgm:pt>
     <dgm:pt modelId="{9215BA6D-8996-4552-B2B9-EBE86864C6A3}">
-      <dgm:prSet/>
+      <dgm:prSet>
+        <dgm:style>
+          <a:lnRef idx="3">
+            <a:schemeClr val="lt1"/>
+          </a:lnRef>
+          <a:fillRef idx="1">
+            <a:schemeClr val="accent4"/>
+          </a:fillRef>
+          <a:effectRef idx="1">
+            <a:schemeClr val="accent4"/>
+          </a:effectRef>
+          <a:fontRef idx="minor">
+            <a:schemeClr val="lt1"/>
+          </a:fontRef>
+        </dgm:style>
+      </dgm:prSet>
       <dgm:spPr/>
       <dgm:t>
         <a:bodyPr/>
         <a:lstStyle/>
         <a:p>
           <a:r>
-            <a:rPr lang="it-IT"/>
+            <a:rPr lang="it-IT">
+              <a:solidFill>
+                <a:schemeClr val="tx1"/>
+              </a:solidFill>
+            </a:rPr>
             <a:t>Urti</a:t>
           </a:r>
-          <a:endParaRPr lang="en-US"/>
+          <a:endParaRPr lang="en-US">
+            <a:solidFill>
+              <a:schemeClr val="tx1"/>
+            </a:solidFill>
+          </a:endParaRPr>
         </a:p>
       </dgm:t>
     </dgm:pt>
@@ -6436,7 +6740,11 @@
         <a:bodyPr/>
         <a:lstStyle/>
         <a:p>
-          <a:endParaRPr lang="en-US"/>
+          <a:endParaRPr lang="en-US">
+            <a:solidFill>
+              <a:schemeClr val="tx1"/>
+            </a:solidFill>
+          </a:endParaRPr>
         </a:p>
       </dgm:t>
     </dgm:pt>
@@ -6447,22 +6755,49 @@
         <a:bodyPr/>
         <a:lstStyle/>
         <a:p>
-          <a:endParaRPr lang="en-US"/>
+          <a:endParaRPr lang="en-US">
+            <a:solidFill>
+              <a:schemeClr val="tx1"/>
+            </a:solidFill>
+          </a:endParaRPr>
         </a:p>
       </dgm:t>
     </dgm:pt>
     <dgm:pt modelId="{0BF9EA02-BE00-4AB9-BA6A-9D53253188E9}">
-      <dgm:prSet/>
+      <dgm:prSet>
+        <dgm:style>
+          <a:lnRef idx="3">
+            <a:schemeClr val="lt1"/>
+          </a:lnRef>
+          <a:fillRef idx="1">
+            <a:schemeClr val="accent4"/>
+          </a:fillRef>
+          <a:effectRef idx="1">
+            <a:schemeClr val="accent4"/>
+          </a:effectRef>
+          <a:fontRef idx="minor">
+            <a:schemeClr val="lt1"/>
+          </a:fontRef>
+        </dgm:style>
+      </dgm:prSet>
       <dgm:spPr/>
       <dgm:t>
         <a:bodyPr/>
         <a:lstStyle/>
         <a:p>
           <a:r>
-            <a:rPr lang="it-IT"/>
+            <a:rPr lang="it-IT">
+              <a:solidFill>
+                <a:schemeClr val="tx1"/>
+              </a:solidFill>
+            </a:rPr>
             <a:t>Eliminazione</a:t>
           </a:r>
-          <a:endParaRPr lang="en-US"/>
+          <a:endParaRPr lang="en-US">
+            <a:solidFill>
+              <a:schemeClr val="tx1"/>
+            </a:solidFill>
+          </a:endParaRPr>
         </a:p>
       </dgm:t>
     </dgm:pt>
@@ -6473,7 +6808,11 @@
         <a:bodyPr/>
         <a:lstStyle/>
         <a:p>
-          <a:endParaRPr lang="en-US"/>
+          <a:endParaRPr lang="en-US">
+            <a:solidFill>
+              <a:schemeClr val="tx1"/>
+            </a:solidFill>
+          </a:endParaRPr>
         </a:p>
       </dgm:t>
     </dgm:pt>
@@ -6484,22 +6823,49 @@
         <a:bodyPr/>
         <a:lstStyle/>
         <a:p>
-          <a:endParaRPr lang="en-US"/>
+          <a:endParaRPr lang="en-US">
+            <a:solidFill>
+              <a:schemeClr val="tx1"/>
+            </a:solidFill>
+          </a:endParaRPr>
         </a:p>
       </dgm:t>
     </dgm:pt>
     <dgm:pt modelId="{3DD5A0AF-F711-4D43-BF1C-06E725B90460}">
-      <dgm:prSet/>
+      <dgm:prSet>
+        <dgm:style>
+          <a:lnRef idx="3">
+            <a:schemeClr val="lt1"/>
+          </a:lnRef>
+          <a:fillRef idx="1">
+            <a:schemeClr val="accent4"/>
+          </a:fillRef>
+          <a:effectRef idx="1">
+            <a:schemeClr val="accent4"/>
+          </a:effectRef>
+          <a:fontRef idx="minor">
+            <a:schemeClr val="lt1"/>
+          </a:fontRef>
+        </dgm:style>
+      </dgm:prSet>
       <dgm:spPr/>
       <dgm:t>
         <a:bodyPr/>
         <a:lstStyle/>
         <a:p>
           <a:r>
-            <a:rPr lang="it-IT"/>
+            <a:rPr lang="it-IT">
+              <a:solidFill>
+                <a:schemeClr val="tx1"/>
+              </a:solidFill>
+            </a:rPr>
             <a:t>Power-ups</a:t>
           </a:r>
-          <a:endParaRPr lang="en-US"/>
+          <a:endParaRPr lang="en-US">
+            <a:solidFill>
+              <a:schemeClr val="tx1"/>
+            </a:solidFill>
+          </a:endParaRPr>
         </a:p>
       </dgm:t>
     </dgm:pt>
@@ -6510,7 +6876,11 @@
         <a:bodyPr/>
         <a:lstStyle/>
         <a:p>
-          <a:endParaRPr lang="en-US"/>
+          <a:endParaRPr lang="en-US">
+            <a:solidFill>
+              <a:schemeClr val="tx1"/>
+            </a:solidFill>
+          </a:endParaRPr>
         </a:p>
       </dgm:t>
     </dgm:pt>
@@ -6521,22 +6891,49 @@
         <a:bodyPr/>
         <a:lstStyle/>
         <a:p>
-          <a:endParaRPr lang="en-US"/>
+          <a:endParaRPr lang="en-US">
+            <a:solidFill>
+              <a:schemeClr val="tx1"/>
+            </a:solidFill>
+          </a:endParaRPr>
         </a:p>
       </dgm:t>
     </dgm:pt>
     <dgm:pt modelId="{BDEA307F-1F3F-4232-AA73-432316802C5C}">
-      <dgm:prSet/>
+      <dgm:prSet>
+        <dgm:style>
+          <a:lnRef idx="3">
+            <a:schemeClr val="lt1"/>
+          </a:lnRef>
+          <a:fillRef idx="1">
+            <a:schemeClr val="accent4"/>
+          </a:fillRef>
+          <a:effectRef idx="1">
+            <a:schemeClr val="accent4"/>
+          </a:effectRef>
+          <a:fontRef idx="minor">
+            <a:schemeClr val="lt1"/>
+          </a:fontRef>
+        </dgm:style>
+      </dgm:prSet>
       <dgm:spPr/>
       <dgm:t>
         <a:bodyPr/>
         <a:lstStyle/>
         <a:p>
           <a:r>
-            <a:rPr lang="it-IT"/>
+            <a:rPr lang="it-IT">
+              <a:solidFill>
+                <a:schemeClr val="tx1"/>
+              </a:solidFill>
+            </a:rPr>
             <a:t>Musica jungle/elettronico</a:t>
           </a:r>
-          <a:endParaRPr lang="en-US"/>
+          <a:endParaRPr lang="en-US">
+            <a:solidFill>
+              <a:schemeClr val="tx1"/>
+            </a:solidFill>
+          </a:endParaRPr>
         </a:p>
       </dgm:t>
     </dgm:pt>
@@ -6547,7 +6944,11 @@
         <a:bodyPr/>
         <a:lstStyle/>
         <a:p>
-          <a:endParaRPr lang="en-US"/>
+          <a:endParaRPr lang="en-US">
+            <a:solidFill>
+              <a:schemeClr val="tx1"/>
+            </a:solidFill>
+          </a:endParaRPr>
         </a:p>
       </dgm:t>
     </dgm:pt>
@@ -6558,7 +6959,11 @@
         <a:bodyPr/>
         <a:lstStyle/>
         <a:p>
-          <a:endParaRPr lang="en-US"/>
+          <a:endParaRPr lang="en-US">
+            <a:solidFill>
+              <a:schemeClr val="tx1"/>
+            </a:solidFill>
+          </a:endParaRPr>
         </a:p>
       </dgm:t>
     </dgm:pt>
@@ -6697,10 +7102,18 @@
         <a:lstStyle/>
         <a:p>
           <a:r>
-            <a:rPr lang="it-IT" sz="2800"/>
+            <a:rPr lang="it-IT" sz="2800" dirty="0">
+              <a:solidFill>
+                <a:schemeClr val="tx1"/>
+              </a:solidFill>
+            </a:rPr>
             <a:t>Free-to-play</a:t>
           </a:r>
-          <a:endParaRPr lang="en-US" sz="2800"/>
+          <a:endParaRPr lang="en-US" sz="2800" dirty="0">
+            <a:solidFill>
+              <a:schemeClr val="tx1"/>
+            </a:solidFill>
+          </a:endParaRPr>
         </a:p>
       </dgm:t>
     </dgm:pt>
@@ -6711,7 +7124,11 @@
         <a:bodyPr/>
         <a:lstStyle/>
         <a:p>
-          <a:endParaRPr lang="en-US" sz="1200"/>
+          <a:endParaRPr lang="en-US" sz="1200">
+            <a:solidFill>
+              <a:schemeClr val="tx1"/>
+            </a:solidFill>
+          </a:endParaRPr>
         </a:p>
       </dgm:t>
     </dgm:pt>
@@ -6722,7 +7139,11 @@
         <a:bodyPr/>
         <a:lstStyle/>
         <a:p>
-          <a:endParaRPr lang="en-US" sz="1200"/>
+          <a:endParaRPr lang="en-US" sz="1200">
+            <a:solidFill>
+              <a:schemeClr val="tx1"/>
+            </a:solidFill>
+          </a:endParaRPr>
         </a:p>
       </dgm:t>
     </dgm:pt>
@@ -6734,10 +7155,18 @@
         <a:lstStyle/>
         <a:p>
           <a:r>
-            <a:rPr lang="it-IT" sz="2800"/>
+            <a:rPr lang="it-IT" sz="2800">
+              <a:solidFill>
+                <a:schemeClr val="tx1"/>
+              </a:solidFill>
+            </a:rPr>
             <a:t>Acquisti in-game</a:t>
           </a:r>
-          <a:endParaRPr lang="en-US" sz="2800"/>
+          <a:endParaRPr lang="en-US" sz="2800">
+            <a:solidFill>
+              <a:schemeClr val="tx1"/>
+            </a:solidFill>
+          </a:endParaRPr>
         </a:p>
       </dgm:t>
     </dgm:pt>
@@ -6748,7 +7177,11 @@
         <a:bodyPr/>
         <a:lstStyle/>
         <a:p>
-          <a:endParaRPr lang="en-US" sz="1200"/>
+          <a:endParaRPr lang="en-US" sz="1200">
+            <a:solidFill>
+              <a:schemeClr val="tx1"/>
+            </a:solidFill>
+          </a:endParaRPr>
         </a:p>
       </dgm:t>
     </dgm:pt>
@@ -6759,7 +7192,11 @@
         <a:bodyPr/>
         <a:lstStyle/>
         <a:p>
-          <a:endParaRPr lang="en-US" sz="1200"/>
+          <a:endParaRPr lang="en-US" sz="1200">
+            <a:solidFill>
+              <a:schemeClr val="tx1"/>
+            </a:solidFill>
+          </a:endParaRPr>
         </a:p>
       </dgm:t>
     </dgm:pt>
@@ -6771,10 +7208,18 @@
         <a:lstStyle/>
         <a:p>
           <a:r>
-            <a:rPr lang="it-IT" sz="2800" dirty="0" err="1"/>
+            <a:rPr lang="it-IT" sz="2800" dirty="0" err="1">
+              <a:solidFill>
+                <a:schemeClr val="tx1"/>
+              </a:solidFill>
+            </a:rPr>
             <a:t>AdMob</a:t>
           </a:r>
-          <a:endParaRPr lang="en-US" sz="2800" dirty="0"/>
+          <a:endParaRPr lang="en-US" sz="2800" dirty="0">
+            <a:solidFill>
+              <a:schemeClr val="tx1"/>
+            </a:solidFill>
+          </a:endParaRPr>
         </a:p>
       </dgm:t>
     </dgm:pt>
@@ -6785,7 +7230,11 @@
         <a:bodyPr/>
         <a:lstStyle/>
         <a:p>
-          <a:endParaRPr lang="en-US" sz="1200"/>
+          <a:endParaRPr lang="en-US" sz="1200">
+            <a:solidFill>
+              <a:schemeClr val="tx1"/>
+            </a:solidFill>
+          </a:endParaRPr>
         </a:p>
       </dgm:t>
     </dgm:pt>
@@ -6796,7 +7245,11 @@
         <a:bodyPr/>
         <a:lstStyle/>
         <a:p>
-          <a:endParaRPr lang="en-US" sz="1200"/>
+          <a:endParaRPr lang="en-US" sz="1200">
+            <a:solidFill>
+              <a:schemeClr val="tx1"/>
+            </a:solidFill>
+          </a:endParaRPr>
         </a:p>
       </dgm:t>
     </dgm:pt>
@@ -6974,8 +7427,16 @@
             <a:buNone/>
           </a:pPr>
           <a:r>
+            <a:rPr lang="en-US" sz="3700" kern="1200" dirty="0">
+              <a:solidFill>
+                <a:srgbClr val="2E2B21"/>
+              </a:solidFill>
+            </a:rPr>
+            <a:t>Multiplayer</a:t>
+          </a:r>
+          <a:r>
             <a:rPr lang="en-US" sz="3700" kern="1200" dirty="0"/>
-            <a:t>Multiplayer competitiv</a:t>
+            <a:t> competitiv</a:t>
           </a:r>
           <a:r>
             <a:rPr lang="it-IT" sz="3700" kern="1200" dirty="0"/>
@@ -7401,10 +7862,18 @@
             <a:buNone/>
           </a:pPr>
           <a:r>
-            <a:rPr lang="it-IT" sz="1800" kern="1200"/>
+            <a:rPr lang="it-IT" sz="1800" kern="1200">
+              <a:solidFill>
+                <a:schemeClr val="tx1"/>
+              </a:solidFill>
+            </a:rPr>
             <a:t>Network</a:t>
           </a:r>
-          <a:endParaRPr lang="en-US" sz="1800" kern="1200"/>
+          <a:endParaRPr lang="en-US" sz="1800" kern="1200">
+            <a:solidFill>
+              <a:schemeClr val="tx1"/>
+            </a:solidFill>
+          </a:endParaRPr>
         </a:p>
       </dsp:txBody>
       <dsp:txXfrm rot="-5400000">
@@ -7513,7 +7982,11 @@
             </a:spcAft>
             <a:buNone/>
           </a:pPr>
-          <a:endParaRPr lang="en-US" sz="4400" kern="1200"/>
+          <a:endParaRPr lang="en-US" sz="4400" kern="1200">
+            <a:solidFill>
+              <a:schemeClr val="tx1"/>
+            </a:solidFill>
+          </a:endParaRPr>
         </a:p>
       </dsp:txBody>
       <dsp:txXfrm rot="-5400000">
@@ -7591,10 +8064,18 @@
             <a:buNone/>
           </a:pPr>
           <a:r>
-            <a:rPr lang="it-IT" sz="1800" kern="1200" dirty="0"/>
+            <a:rPr lang="it-IT" sz="1800" kern="1200" dirty="0">
+              <a:solidFill>
+                <a:schemeClr val="tx1"/>
+              </a:solidFill>
+            </a:rPr>
             <a:t>Motore fisico JLiquidFun</a:t>
           </a:r>
-          <a:endParaRPr lang="en-US" sz="1800" kern="1200" dirty="0"/>
+          <a:endParaRPr lang="en-US" sz="1800" kern="1200" dirty="0">
+            <a:solidFill>
+              <a:schemeClr val="tx1"/>
+            </a:solidFill>
+          </a:endParaRPr>
         </a:p>
       </dsp:txBody>
       <dsp:txXfrm rot="-5400000">
@@ -7703,7 +8184,11 @@
             </a:spcAft>
             <a:buNone/>
           </a:pPr>
-          <a:endParaRPr lang="en-US" sz="4400" kern="1200"/>
+          <a:endParaRPr lang="en-US" sz="4400" kern="1200">
+            <a:solidFill>
+              <a:schemeClr val="tx1"/>
+            </a:solidFill>
+          </a:endParaRPr>
         </a:p>
       </dsp:txBody>
       <dsp:txXfrm rot="-5400000">
@@ -7781,10 +8266,18 @@
             <a:buNone/>
           </a:pPr>
           <a:r>
-            <a:rPr lang="it-IT" sz="1800" kern="1200" dirty="0"/>
+            <a:rPr lang="it-IT" sz="1800" kern="1200" dirty="0">
+              <a:solidFill>
+                <a:schemeClr val="tx1"/>
+              </a:solidFill>
+            </a:rPr>
             <a:t>Render grafico Canvas</a:t>
           </a:r>
-          <a:endParaRPr lang="en-US" sz="1800" kern="1200" dirty="0"/>
+          <a:endParaRPr lang="en-US" sz="1800" kern="1200" dirty="0">
+            <a:solidFill>
+              <a:schemeClr val="tx1"/>
+            </a:solidFill>
+          </a:endParaRPr>
         </a:p>
       </dsp:txBody>
       <dsp:txXfrm rot="-5400000">
@@ -7893,7 +8386,11 @@
             </a:spcAft>
             <a:buNone/>
           </a:pPr>
-          <a:endParaRPr lang="en-US" sz="4400" kern="1200"/>
+          <a:endParaRPr lang="en-US" sz="4400" kern="1200">
+            <a:solidFill>
+              <a:schemeClr val="tx1"/>
+            </a:solidFill>
+          </a:endParaRPr>
         </a:p>
       </dsp:txBody>
       <dsp:txXfrm rot="-5400000">
@@ -8324,17 +8821,33 @@
             <a:buNone/>
           </a:pPr>
           <a:r>
-            <a:rPr lang="it-IT" sz="2300" kern="1200" dirty="0"/>
+            <a:rPr lang="it-IT" sz="2300" kern="1200" dirty="0">
+              <a:solidFill>
+                <a:schemeClr val="tx1"/>
+              </a:solidFill>
+            </a:rPr>
             <a:t>Power-up</a:t>
           </a:r>
           <a:br>
-            <a:rPr lang="it-IT" sz="2300" kern="1200" dirty="0"/>
+            <a:rPr lang="it-IT" sz="2300" kern="1200" dirty="0">
+              <a:solidFill>
+                <a:schemeClr val="tx1"/>
+              </a:solidFill>
+            </a:rPr>
           </a:br>
           <a:r>
-            <a:rPr lang="it-IT" sz="2300" kern="1200" dirty="0"/>
+            <a:rPr lang="it-IT" sz="2300" kern="1200" dirty="0">
+              <a:solidFill>
+                <a:schemeClr val="tx1"/>
+              </a:solidFill>
+            </a:rPr>
             <a:t>(immagini sample?)</a:t>
           </a:r>
-          <a:endParaRPr lang="en-US" sz="2300" kern="1200" dirty="0"/>
+          <a:endParaRPr lang="en-US" sz="2300" kern="1200" dirty="0">
+            <a:solidFill>
+              <a:schemeClr val="tx1"/>
+            </a:solidFill>
+          </a:endParaRPr>
         </a:p>
       </dsp:txBody>
       <dsp:txXfrm>
@@ -8413,7 +8926,11 @@
             </a:spcAft>
             <a:buNone/>
           </a:pPr>
-          <a:endParaRPr lang="en-US" sz="600" kern="1200"/>
+          <a:endParaRPr lang="en-US" sz="600" kern="1200">
+            <a:solidFill>
+              <a:schemeClr val="tx1"/>
+            </a:solidFill>
+          </a:endParaRPr>
         </a:p>
       </dsp:txBody>
       <dsp:txXfrm>
@@ -8490,10 +9007,18 @@
             <a:buNone/>
           </a:pPr>
           <a:r>
-            <a:rPr lang="it-IT" sz="2300" kern="1200"/>
+            <a:rPr lang="it-IT" sz="2300" kern="1200">
+              <a:solidFill>
+                <a:schemeClr val="tx1"/>
+              </a:solidFill>
+            </a:rPr>
             <a:t>Ridimensionamento del personaggio</a:t>
           </a:r>
-          <a:endParaRPr lang="en-US" sz="2300" kern="1200"/>
+          <a:endParaRPr lang="en-US" sz="2300" kern="1200">
+            <a:solidFill>
+              <a:schemeClr val="tx1"/>
+            </a:solidFill>
+          </a:endParaRPr>
         </a:p>
       </dsp:txBody>
       <dsp:txXfrm>
@@ -8572,7 +9097,11 @@
             </a:spcAft>
             <a:buNone/>
           </a:pPr>
-          <a:endParaRPr lang="en-US" sz="500" kern="1200"/>
+          <a:endParaRPr lang="en-US" sz="500" kern="1200">
+            <a:solidFill>
+              <a:schemeClr val="tx1"/>
+            </a:solidFill>
+          </a:endParaRPr>
         </a:p>
       </dsp:txBody>
       <dsp:txXfrm>
@@ -8649,10 +9178,18 @@
             <a:buNone/>
           </a:pPr>
           <a:r>
-            <a:rPr lang="it-IT" sz="2300" kern="1200"/>
+            <a:rPr lang="it-IT" sz="2300" kern="1200">
+              <a:solidFill>
+                <a:schemeClr val="tx1"/>
+              </a:solidFill>
+            </a:rPr>
             <a:t>Cambio di velocità</a:t>
           </a:r>
-          <a:endParaRPr lang="en-US" sz="2300" kern="1200"/>
+          <a:endParaRPr lang="en-US" sz="2300" kern="1200">
+            <a:solidFill>
+              <a:schemeClr val="tx1"/>
+            </a:solidFill>
+          </a:endParaRPr>
         </a:p>
       </dsp:txBody>
       <dsp:txXfrm>
@@ -8731,7 +9268,11 @@
             </a:spcAft>
             <a:buNone/>
           </a:pPr>
-          <a:endParaRPr lang="en-US" sz="600" kern="1200"/>
+          <a:endParaRPr lang="en-US" sz="600" kern="1200">
+            <a:solidFill>
+              <a:schemeClr val="tx1"/>
+            </a:solidFill>
+          </a:endParaRPr>
         </a:p>
       </dsp:txBody>
       <dsp:txXfrm>
@@ -8808,10 +9349,18 @@
             <a:buNone/>
           </a:pPr>
           <a:r>
-            <a:rPr lang="it-IT" sz="2300" kern="1200"/>
+            <a:rPr lang="it-IT" sz="2300" kern="1200">
+              <a:solidFill>
+                <a:schemeClr val="tx1"/>
+              </a:solidFill>
+            </a:rPr>
             <a:t>Armi</a:t>
           </a:r>
-          <a:endParaRPr lang="en-US" sz="2300" kern="1200"/>
+          <a:endParaRPr lang="en-US" sz="2300" kern="1200">
+            <a:solidFill>
+              <a:schemeClr val="tx1"/>
+            </a:solidFill>
+          </a:endParaRPr>
         </a:p>
       </dsp:txBody>
       <dsp:txXfrm>
@@ -8888,25 +9437,49 @@
             <a:buNone/>
           </a:pPr>
           <a:r>
-            <a:rPr lang="it-IT" sz="2300" kern="1200" dirty="0"/>
+            <a:rPr lang="it-IT" sz="2300" kern="1200" dirty="0">
+              <a:solidFill>
+                <a:schemeClr val="tx1"/>
+              </a:solidFill>
+            </a:rPr>
             <a:t>Diverse mappe</a:t>
           </a:r>
           <a:br>
-            <a:rPr lang="it-IT" sz="2300" kern="1200" dirty="0"/>
+            <a:rPr lang="it-IT" sz="2300" kern="1200" dirty="0">
+              <a:solidFill>
+                <a:schemeClr val="tx1"/>
+              </a:solidFill>
+            </a:rPr>
           </a:br>
           <a:r>
-            <a:rPr lang="it-IT" sz="2300" kern="1200" dirty="0"/>
+            <a:rPr lang="it-IT" sz="2300" kern="1200" dirty="0">
+              <a:solidFill>
+                <a:schemeClr val="tx1"/>
+              </a:solidFill>
+            </a:rPr>
             <a:t>(</a:t>
           </a:r>
           <a:r>
-            <a:rPr lang="it-IT" sz="2300" kern="1200" dirty="0" err="1"/>
+            <a:rPr lang="it-IT" sz="2300" kern="1200" dirty="0" err="1">
+              <a:solidFill>
+                <a:schemeClr val="tx1"/>
+              </a:solidFill>
+            </a:rPr>
             <a:t>parsing</a:t>
           </a:r>
           <a:r>
-            <a:rPr lang="it-IT" sz="2300" kern="1200" dirty="0"/>
+            <a:rPr lang="it-IT" sz="2300" kern="1200" dirty="0">
+              <a:solidFill>
+                <a:schemeClr val="tx1"/>
+              </a:solidFill>
+            </a:rPr>
             <a:t>?)</a:t>
           </a:r>
-          <a:endParaRPr lang="en-US" sz="2300" kern="1200" dirty="0"/>
+          <a:endParaRPr lang="en-US" sz="2300" kern="1200" dirty="0">
+            <a:solidFill>
+              <a:schemeClr val="tx1"/>
+            </a:solidFill>
+          </a:endParaRPr>
         </a:p>
       </dsp:txBody>
       <dsp:txXfrm>
@@ -8985,7 +9558,11 @@
             </a:spcAft>
             <a:buNone/>
           </a:pPr>
-          <a:endParaRPr lang="en-US" sz="500" kern="1200"/>
+          <a:endParaRPr lang="en-US" sz="500" kern="1200">
+            <a:solidFill>
+              <a:schemeClr val="tx1"/>
+            </a:solidFill>
+          </a:endParaRPr>
         </a:p>
       </dsp:txBody>
       <dsp:txXfrm>
@@ -9062,10 +9639,18 @@
             <a:buNone/>
           </a:pPr>
           <a:r>
-            <a:rPr lang="it-IT" sz="2300" kern="1200"/>
+            <a:rPr lang="it-IT" sz="2300" kern="1200">
+              <a:solidFill>
+                <a:schemeClr val="tx1"/>
+              </a:solidFill>
+            </a:rPr>
             <a:t>Gravità</a:t>
           </a:r>
-          <a:endParaRPr lang="en-US" sz="2300" kern="1200"/>
+          <a:endParaRPr lang="en-US" sz="2300" kern="1200">
+            <a:solidFill>
+              <a:schemeClr val="tx1"/>
+            </a:solidFill>
+          </a:endParaRPr>
         </a:p>
       </dsp:txBody>
       <dsp:txXfrm>
@@ -9144,7 +9729,11 @@
             </a:spcAft>
             <a:buNone/>
           </a:pPr>
-          <a:endParaRPr lang="en-US" sz="500" kern="1200"/>
+          <a:endParaRPr lang="en-US" sz="500" kern="1200">
+            <a:solidFill>
+              <a:schemeClr val="tx1"/>
+            </a:solidFill>
+          </a:endParaRPr>
         </a:p>
       </dsp:txBody>
       <dsp:txXfrm>
@@ -9221,10 +9810,18 @@
             <a:buNone/>
           </a:pPr>
           <a:r>
-            <a:rPr lang="it-IT" sz="2300" kern="1200"/>
+            <a:rPr lang="it-IT" sz="2300" kern="1200">
+              <a:solidFill>
+                <a:schemeClr val="tx1"/>
+              </a:solidFill>
+            </a:rPr>
             <a:t>Buchi(?) all’interno dell’arena</a:t>
           </a:r>
-          <a:endParaRPr lang="en-US" sz="2300" kern="1200"/>
+          <a:endParaRPr lang="en-US" sz="2300" kern="1200">
+            <a:solidFill>
+              <a:schemeClr val="tx1"/>
+            </a:solidFill>
+          </a:endParaRPr>
         </a:p>
       </dsp:txBody>
       <dsp:txXfrm>
@@ -9258,39 +9855,29 @@
           <a:avLst/>
         </a:prstGeom>
         <a:solidFill>
-          <a:schemeClr val="accent6">
-            <a:alpha val="90000"/>
-            <a:tint val="40000"/>
-            <a:hueOff val="0"/>
-            <a:satOff val="0"/>
-            <a:lumOff val="0"/>
-            <a:alphaOff val="0"/>
-          </a:schemeClr>
+          <a:schemeClr val="accent4"/>
         </a:solidFill>
-        <a:ln w="9525" cap="flat" cmpd="sng" algn="ctr">
+        <a:ln w="19050" cap="flat" cmpd="sng" algn="ctr">
           <a:solidFill>
-            <a:schemeClr val="accent6">
-              <a:hueOff val="0"/>
-              <a:satOff val="0"/>
-              <a:lumOff val="0"/>
-              <a:alphaOff val="0"/>
-            </a:schemeClr>
+            <a:schemeClr val="lt1"/>
           </a:solidFill>
           <a:prstDash val="solid"/>
         </a:ln>
         <a:effectLst/>
       </dsp:spPr>
       <dsp:style>
-        <a:lnRef idx="1">
-          <a:scrgbClr r="0" g="0" b="0"/>
+        <a:lnRef idx="3">
+          <a:schemeClr val="lt1"/>
         </a:lnRef>
         <a:fillRef idx="1">
-          <a:scrgbClr r="0" g="0" b="0"/>
+          <a:schemeClr val="accent4"/>
         </a:fillRef>
-        <a:effectRef idx="0">
-          <a:scrgbClr r="0" g="0" b="0"/>
+        <a:effectRef idx="1">
+          <a:schemeClr val="accent4"/>
         </a:effectRef>
-        <a:fontRef idx="minor"/>
+        <a:fontRef idx="minor">
+          <a:schemeClr val="lt1"/>
+        </a:fontRef>
       </dsp:style>
       <dsp:txBody>
         <a:bodyPr spcFirstLastPara="0" vert="horz" wrap="square" lIns="437880" tIns="624840" rIns="437880" bIns="213360" numCol="1" spcCol="1270" anchor="t" anchorCtr="0">
@@ -9311,10 +9898,18 @@
             <a:buChar char="•"/>
           </a:pPr>
           <a:r>
-            <a:rPr lang="it-IT" sz="3000" kern="1200"/>
+            <a:rPr lang="it-IT" sz="3000" kern="1200">
+              <a:solidFill>
+                <a:schemeClr val="tx1"/>
+              </a:solidFill>
+            </a:rPr>
             <a:t>Bird’s eye view</a:t>
           </a:r>
-          <a:endParaRPr lang="en-US" sz="3000" kern="1200"/>
+          <a:endParaRPr lang="en-US" sz="3000" kern="1200">
+            <a:solidFill>
+              <a:schemeClr val="tx1"/>
+            </a:solidFill>
+          </a:endParaRPr>
         </a:p>
       </dsp:txBody>
       <dsp:txXfrm>
@@ -9335,14 +9930,10 @@
         <a:prstGeom prst="roundRect">
           <a:avLst/>
         </a:prstGeom>
-        <a:gradFill rotWithShape="0">
+        <a:gradFill rotWithShape="1">
           <a:gsLst>
             <a:gs pos="0">
-              <a:schemeClr val="lt1">
-                <a:hueOff val="0"/>
-                <a:satOff val="0"/>
-                <a:lumOff val="0"/>
-                <a:alphaOff val="0"/>
+              <a:schemeClr val="accent2">
                 <a:tint val="100000"/>
                 <a:shade val="85000"/>
                 <a:satMod val="100000"/>
@@ -9350,11 +9941,7 @@
               </a:schemeClr>
             </a:gs>
             <a:gs pos="100000">
-              <a:schemeClr val="lt1">
-                <a:hueOff val="0"/>
-                <a:satOff val="0"/>
-                <a:lumOff val="0"/>
-                <a:alphaOff val="0"/>
+              <a:schemeClr val="accent2">
                 <a:tint val="90000"/>
                 <a:shade val="100000"/>
                 <a:satMod val="150000"/>
@@ -9366,8 +9953,11 @@
             <a:fillToRect l="100000" t="100000" r="100000" b="100000"/>
           </a:path>
         </a:gradFill>
-        <a:ln>
-          <a:noFill/>
+        <a:ln w="9525" cap="flat" cmpd="sng" algn="ctr">
+          <a:solidFill>
+            <a:schemeClr val="accent2"/>
+          </a:solidFill>
+          <a:prstDash val="solid"/>
         </a:ln>
         <a:effectLst>
           <a:outerShdw blurRad="50800" dist="12700" dir="5400000" algn="ctr" rotWithShape="0">
@@ -9378,14 +9968,14 @@
         </a:effectLst>
       </dsp:spPr>
       <dsp:style>
-        <a:lnRef idx="0">
-          <a:scrgbClr r="0" g="0" b="0"/>
+        <a:lnRef idx="1">
+          <a:schemeClr val="accent2"/>
         </a:lnRef>
         <a:fillRef idx="3">
-          <a:scrgbClr r="0" g="0" b="0"/>
+          <a:schemeClr val="accent2"/>
         </a:fillRef>
         <a:effectRef idx="2">
-          <a:scrgbClr r="0" g="0" b="0"/>
+          <a:schemeClr val="accent2"/>
         </a:effectRef>
         <a:fontRef idx="minor">
           <a:schemeClr val="lt1"/>
@@ -9410,10 +10000,18 @@
             <a:buNone/>
           </a:pPr>
           <a:r>
-            <a:rPr lang="it-IT" sz="3000" kern="1200" dirty="0"/>
+            <a:rPr lang="it-IT" sz="3000" kern="1200" dirty="0">
+              <a:solidFill>
+                <a:schemeClr val="tx1"/>
+              </a:solidFill>
+            </a:rPr>
             <a:t>GRAFICA</a:t>
           </a:r>
-          <a:endParaRPr lang="en-US" sz="3000" kern="1200" dirty="0"/>
+          <a:endParaRPr lang="en-US" sz="3000" kern="1200" dirty="0">
+            <a:solidFill>
+              <a:schemeClr val="tx1"/>
+            </a:solidFill>
+          </a:endParaRPr>
         </a:p>
       </dsp:txBody>
       <dsp:txXfrm>
@@ -9435,39 +10033,29 @@
           <a:avLst/>
         </a:prstGeom>
         <a:solidFill>
-          <a:schemeClr val="accent6">
-            <a:alpha val="90000"/>
-            <a:tint val="40000"/>
-            <a:hueOff val="0"/>
-            <a:satOff val="0"/>
-            <a:lumOff val="0"/>
-            <a:alphaOff val="0"/>
-          </a:schemeClr>
+          <a:schemeClr val="accent4"/>
         </a:solidFill>
-        <a:ln w="9525" cap="flat" cmpd="sng" algn="ctr">
+        <a:ln w="19050" cap="flat" cmpd="sng" algn="ctr">
           <a:solidFill>
-            <a:schemeClr val="accent6">
-              <a:hueOff val="0"/>
-              <a:satOff val="0"/>
-              <a:lumOff val="0"/>
-              <a:alphaOff val="0"/>
-            </a:schemeClr>
+            <a:schemeClr val="lt1"/>
           </a:solidFill>
           <a:prstDash val="solid"/>
         </a:ln>
         <a:effectLst/>
       </dsp:spPr>
       <dsp:style>
-        <a:lnRef idx="1">
-          <a:scrgbClr r="0" g="0" b="0"/>
+        <a:lnRef idx="3">
+          <a:schemeClr val="lt1"/>
         </a:lnRef>
         <a:fillRef idx="1">
-          <a:scrgbClr r="0" g="0" b="0"/>
+          <a:schemeClr val="accent4"/>
         </a:fillRef>
-        <a:effectRef idx="0">
-          <a:scrgbClr r="0" g="0" b="0"/>
+        <a:effectRef idx="1">
+          <a:schemeClr val="accent4"/>
         </a:effectRef>
-        <a:fontRef idx="minor"/>
+        <a:fontRef idx="minor">
+          <a:schemeClr val="lt1"/>
+        </a:fontRef>
       </dsp:style>
       <dsp:txBody>
         <a:bodyPr spcFirstLastPara="0" vert="horz" wrap="square" lIns="437880" tIns="624840" rIns="437880" bIns="213360" numCol="1" spcCol="1270" anchor="t" anchorCtr="0">
@@ -9488,10 +10076,18 @@
             <a:buChar char="•"/>
           </a:pPr>
           <a:r>
-            <a:rPr lang="it-IT" sz="3000" kern="1200"/>
+            <a:rPr lang="it-IT" sz="3000" kern="1200">
+              <a:solidFill>
+                <a:schemeClr val="tx1"/>
+              </a:solidFill>
+            </a:rPr>
             <a:t>Urti</a:t>
           </a:r>
-          <a:endParaRPr lang="en-US" sz="3000" kern="1200"/>
+          <a:endParaRPr lang="en-US" sz="3000" kern="1200">
+            <a:solidFill>
+              <a:schemeClr val="tx1"/>
+            </a:solidFill>
+          </a:endParaRPr>
         </a:p>
         <a:p>
           <a:pPr marL="285750" lvl="1" indent="-285750" algn="l" defTabSz="1333500">
@@ -9507,10 +10103,18 @@
             <a:buChar char="•"/>
           </a:pPr>
           <a:r>
-            <a:rPr lang="it-IT" sz="3000" kern="1200"/>
+            <a:rPr lang="it-IT" sz="3000" kern="1200">
+              <a:solidFill>
+                <a:schemeClr val="tx1"/>
+              </a:solidFill>
+            </a:rPr>
             <a:t>Eliminazione</a:t>
           </a:r>
-          <a:endParaRPr lang="en-US" sz="3000" kern="1200"/>
+          <a:endParaRPr lang="en-US" sz="3000" kern="1200">
+            <a:solidFill>
+              <a:schemeClr val="tx1"/>
+            </a:solidFill>
+          </a:endParaRPr>
         </a:p>
         <a:p>
           <a:pPr marL="285750" lvl="1" indent="-285750" algn="l" defTabSz="1333500">
@@ -9526,10 +10130,18 @@
             <a:buChar char="•"/>
           </a:pPr>
           <a:r>
-            <a:rPr lang="it-IT" sz="3000" kern="1200"/>
+            <a:rPr lang="it-IT" sz="3000" kern="1200">
+              <a:solidFill>
+                <a:schemeClr val="tx1"/>
+              </a:solidFill>
+            </a:rPr>
             <a:t>Power-ups</a:t>
           </a:r>
-          <a:endParaRPr lang="en-US" sz="3000" kern="1200"/>
+          <a:endParaRPr lang="en-US" sz="3000" kern="1200">
+            <a:solidFill>
+              <a:schemeClr val="tx1"/>
+            </a:solidFill>
+          </a:endParaRPr>
         </a:p>
         <a:p>
           <a:pPr marL="285750" lvl="1" indent="-285750" algn="l" defTabSz="1333500">
@@ -9545,10 +10157,18 @@
             <a:buChar char="•"/>
           </a:pPr>
           <a:r>
-            <a:rPr lang="it-IT" sz="3000" kern="1200"/>
+            <a:rPr lang="it-IT" sz="3000" kern="1200">
+              <a:solidFill>
+                <a:schemeClr val="tx1"/>
+              </a:solidFill>
+            </a:rPr>
             <a:t>Musica jungle/elettronico</a:t>
           </a:r>
-          <a:endParaRPr lang="en-US" sz="3000" kern="1200"/>
+          <a:endParaRPr lang="en-US" sz="3000" kern="1200">
+            <a:solidFill>
+              <a:schemeClr val="tx1"/>
+            </a:solidFill>
+          </a:endParaRPr>
         </a:p>
       </dsp:txBody>
       <dsp:txXfrm>
@@ -9569,14 +10189,10 @@
         <a:prstGeom prst="roundRect">
           <a:avLst/>
         </a:prstGeom>
-        <a:gradFill rotWithShape="0">
+        <a:gradFill rotWithShape="1">
           <a:gsLst>
             <a:gs pos="0">
-              <a:schemeClr val="lt1">
-                <a:hueOff val="0"/>
-                <a:satOff val="0"/>
-                <a:lumOff val="0"/>
-                <a:alphaOff val="0"/>
+              <a:schemeClr val="accent2">
                 <a:tint val="100000"/>
                 <a:shade val="85000"/>
                 <a:satMod val="100000"/>
@@ -9584,11 +10200,7 @@
               </a:schemeClr>
             </a:gs>
             <a:gs pos="100000">
-              <a:schemeClr val="lt1">
-                <a:hueOff val="0"/>
-                <a:satOff val="0"/>
-                <a:lumOff val="0"/>
-                <a:alphaOff val="0"/>
+              <a:schemeClr val="accent2">
                 <a:tint val="90000"/>
                 <a:shade val="100000"/>
                 <a:satMod val="150000"/>
@@ -9600,8 +10212,11 @@
             <a:fillToRect l="100000" t="100000" r="100000" b="100000"/>
           </a:path>
         </a:gradFill>
-        <a:ln>
-          <a:noFill/>
+        <a:ln w="9525" cap="flat" cmpd="sng" algn="ctr">
+          <a:solidFill>
+            <a:schemeClr val="accent2"/>
+          </a:solidFill>
+          <a:prstDash val="solid"/>
         </a:ln>
         <a:effectLst>
           <a:outerShdw blurRad="50800" dist="12700" dir="5400000" algn="ctr" rotWithShape="0">
@@ -9612,14 +10227,14 @@
         </a:effectLst>
       </dsp:spPr>
       <dsp:style>
-        <a:lnRef idx="0">
-          <a:scrgbClr r="0" g="0" b="0"/>
+        <a:lnRef idx="1">
+          <a:schemeClr val="accent2"/>
         </a:lnRef>
         <a:fillRef idx="3">
-          <a:scrgbClr r="0" g="0" b="0"/>
+          <a:schemeClr val="accent2"/>
         </a:fillRef>
         <a:effectRef idx="2">
-          <a:scrgbClr r="0" g="0" b="0"/>
+          <a:schemeClr val="accent2"/>
         </a:effectRef>
         <a:fontRef idx="minor">
           <a:schemeClr val="lt1"/>
@@ -9644,7 +10259,11 @@
             <a:buNone/>
           </a:pPr>
           <a:r>
-            <a:rPr lang="en-US" sz="3000" kern="1200" dirty="0"/>
+            <a:rPr lang="en-US" sz="3000" kern="1200" dirty="0">
+              <a:solidFill>
+                <a:schemeClr val="tx1"/>
+              </a:solidFill>
+            </a:rPr>
             <a:t>SONORO</a:t>
           </a:r>
         </a:p>
@@ -9779,10 +10398,18 @@
             <a:buNone/>
           </a:pPr>
           <a:r>
-            <a:rPr lang="it-IT" sz="2800" kern="1200"/>
+            <a:rPr lang="it-IT" sz="2800" kern="1200" dirty="0">
+              <a:solidFill>
+                <a:schemeClr val="tx1"/>
+              </a:solidFill>
+            </a:rPr>
             <a:t>Free-to-play</a:t>
           </a:r>
-          <a:endParaRPr lang="en-US" sz="2800" kern="1200"/>
+          <a:endParaRPr lang="en-US" sz="2800" kern="1200" dirty="0">
+            <a:solidFill>
+              <a:schemeClr val="tx1"/>
+            </a:solidFill>
+          </a:endParaRPr>
         </a:p>
       </dsp:txBody>
       <dsp:txXfrm>
@@ -9857,10 +10484,18 @@
             <a:buNone/>
           </a:pPr>
           <a:r>
-            <a:rPr lang="it-IT" sz="2800" kern="1200"/>
+            <a:rPr lang="it-IT" sz="2800" kern="1200">
+              <a:solidFill>
+                <a:schemeClr val="tx1"/>
+              </a:solidFill>
+            </a:rPr>
             <a:t>Acquisti in-game</a:t>
           </a:r>
-          <a:endParaRPr lang="en-US" sz="2800" kern="1200"/>
+          <a:endParaRPr lang="en-US" sz="2800" kern="1200">
+            <a:solidFill>
+              <a:schemeClr val="tx1"/>
+            </a:solidFill>
+          </a:endParaRPr>
         </a:p>
       </dsp:txBody>
       <dsp:txXfrm>
@@ -9935,10 +10570,18 @@
             <a:buNone/>
           </a:pPr>
           <a:r>
-            <a:rPr lang="it-IT" sz="2800" kern="1200" dirty="0" err="1"/>
+            <a:rPr lang="it-IT" sz="2800" kern="1200" dirty="0" err="1">
+              <a:solidFill>
+                <a:schemeClr val="tx1"/>
+              </a:solidFill>
+            </a:rPr>
             <a:t>AdMob</a:t>
           </a:r>
-          <a:endParaRPr lang="en-US" sz="2800" kern="1200" dirty="0"/>
+          <a:endParaRPr lang="en-US" sz="2800" kern="1200" dirty="0">
+            <a:solidFill>
+              <a:schemeClr val="tx1"/>
+            </a:solidFill>
+          </a:endParaRPr>
         </a:p>
       </dsp:txBody>
       <dsp:txXfrm>
@@ -22190,7 +22833,7 @@
           <p:nvPr>
             <p:extLst>
               <p:ext uri="{D42A27DB-BD31-4B8C-83A1-F6EECF244321}">
-                <p14:modId xmlns:p14="http://schemas.microsoft.com/office/powerpoint/2010/main" val="3347050955"/>
+                <p14:modId xmlns:p14="http://schemas.microsoft.com/office/powerpoint/2010/main" val="1960872785"/>
               </p:ext>
             </p:extLst>
           </p:nvPr>
@@ -22994,7 +23637,7 @@
             <p:ph idx="1"/>
             <p:extLst>
               <p:ext uri="{D42A27DB-BD31-4B8C-83A1-F6EECF244321}">
-                <p14:modId xmlns:p14="http://schemas.microsoft.com/office/powerpoint/2010/main" val="3208947521"/>
+                <p14:modId xmlns:p14="http://schemas.microsoft.com/office/powerpoint/2010/main" val="1895618581"/>
               </p:ext>
             </p:extLst>
           </p:nvPr>
@@ -23332,7 +23975,7 @@
             <p:ph idx="1"/>
             <p:extLst>
               <p:ext uri="{D42A27DB-BD31-4B8C-83A1-F6EECF244321}">
-                <p14:modId xmlns:p14="http://schemas.microsoft.com/office/powerpoint/2010/main" val="3726780222"/>
+                <p14:modId xmlns:p14="http://schemas.microsoft.com/office/powerpoint/2010/main" val="524930453"/>
               </p:ext>
             </p:extLst>
           </p:nvPr>
@@ -23501,7 +24144,7 @@
             <p:ph idx="1"/>
             <p:extLst>
               <p:ext uri="{D42A27DB-BD31-4B8C-83A1-F6EECF244321}">
-                <p14:modId xmlns:p14="http://schemas.microsoft.com/office/powerpoint/2010/main" val="2614841906"/>
+                <p14:modId xmlns:p14="http://schemas.microsoft.com/office/powerpoint/2010/main" val="2101711921"/>
               </p:ext>
             </p:extLst>
           </p:nvPr>
@@ -23670,7 +24313,7 @@
             <p:ph idx="1"/>
             <p:extLst>
               <p:ext uri="{D42A27DB-BD31-4B8C-83A1-F6EECF244321}">
-                <p14:modId xmlns:p14="http://schemas.microsoft.com/office/powerpoint/2010/main" val="3466496369"/>
+                <p14:modId xmlns:p14="http://schemas.microsoft.com/office/powerpoint/2010/main" val="867868538"/>
               </p:ext>
             </p:extLst>
           </p:nvPr>

</xml_diff>

<commit_message>
added extra to v1.0
</commit_message>
<xml_diff>
--- a/Pitch/PITCH.pptx
+++ b/Pitch/PITCH.pptx
@@ -6404,6 +6404,136 @@
         </a:p>
       </dgm:t>
     </dgm:pt>
+    <dgm:pt modelId="{B5763AE2-1134-4B67-9EB9-323E7ACD6CD3}">
+      <dgm:prSet custT="1"/>
+      <dgm:spPr/>
+      <dgm:t>
+        <a:bodyPr/>
+        <a:lstStyle/>
+        <a:p>
+          <a:r>
+            <a:rPr lang="en-US" sz="1800" dirty="0">
+              <a:solidFill>
+                <a:schemeClr val="tx1"/>
+              </a:solidFill>
+            </a:rPr>
+            <a:t>Extra</a:t>
+          </a:r>
+        </a:p>
+      </dgm:t>
+    </dgm:pt>
+    <dgm:pt modelId="{D0F23480-9490-4F67-BC54-EAA1CF892EE6}" type="parTrans" cxnId="{7CE802B4-E63A-4FE4-A1AF-ADCDED9EAD3D}">
+      <dgm:prSet/>
+      <dgm:spPr/>
+      <dgm:t>
+        <a:bodyPr/>
+        <a:lstStyle/>
+        <a:p>
+          <a:endParaRPr lang="it-IT"/>
+        </a:p>
+      </dgm:t>
+    </dgm:pt>
+    <dgm:pt modelId="{7AB8DE81-1752-4A53-8DD5-66CA6C433B26}" type="sibTrans" cxnId="{7CE802B4-E63A-4FE4-A1AF-ADCDED9EAD3D}">
+      <dgm:prSet/>
+      <dgm:spPr/>
+      <dgm:t>
+        <a:bodyPr/>
+        <a:lstStyle/>
+        <a:p>
+          <a:endParaRPr lang="it-IT"/>
+        </a:p>
+      </dgm:t>
+    </dgm:pt>
+    <dgm:pt modelId="{A0B5271F-30E6-474C-B554-83F4DA6A2DA8}">
+      <dgm:prSet custT="1"/>
+      <dgm:spPr/>
+      <dgm:t>
+        <a:bodyPr/>
+        <a:lstStyle/>
+        <a:p>
+          <a:r>
+            <a:rPr lang="en-US" sz="1800" dirty="0" err="1">
+              <a:solidFill>
+                <a:schemeClr val="tx1"/>
+              </a:solidFill>
+            </a:rPr>
+            <a:t>Classifica</a:t>
+          </a:r>
+          <a:endParaRPr lang="en-US" sz="1800" dirty="0">
+            <a:solidFill>
+              <a:schemeClr val="tx1"/>
+            </a:solidFill>
+          </a:endParaRPr>
+        </a:p>
+      </dgm:t>
+    </dgm:pt>
+    <dgm:pt modelId="{769C54F0-38BA-417E-A52D-63B918D02982}" type="parTrans" cxnId="{07001DD5-4487-46BA-A0D0-82C6E0CC001F}">
+      <dgm:prSet/>
+      <dgm:spPr/>
+      <dgm:t>
+        <a:bodyPr/>
+        <a:lstStyle/>
+        <a:p>
+          <a:endParaRPr lang="it-IT"/>
+        </a:p>
+      </dgm:t>
+    </dgm:pt>
+    <dgm:pt modelId="{09913088-1E5F-484E-99A8-4A817EA398A8}" type="sibTrans" cxnId="{07001DD5-4487-46BA-A0D0-82C6E0CC001F}">
+      <dgm:prSet/>
+      <dgm:spPr/>
+      <dgm:t>
+        <a:bodyPr/>
+        <a:lstStyle/>
+        <a:p>
+          <a:endParaRPr lang="it-IT"/>
+        </a:p>
+      </dgm:t>
+    </dgm:pt>
+    <dgm:pt modelId="{05FC2DDD-8716-4BD0-AD0F-B5E4C40D798F}">
+      <dgm:prSet custT="1"/>
+      <dgm:spPr/>
+      <dgm:t>
+        <a:bodyPr/>
+        <a:lstStyle/>
+        <a:p>
+          <a:r>
+            <a:rPr lang="en-US" sz="1800" dirty="0" err="1">
+              <a:solidFill>
+                <a:schemeClr val="tx1"/>
+              </a:solidFill>
+            </a:rPr>
+            <a:t>Obbiettivi</a:t>
+          </a:r>
+          <a:endParaRPr lang="en-US" sz="1800" dirty="0">
+            <a:solidFill>
+              <a:schemeClr val="tx1"/>
+            </a:solidFill>
+          </a:endParaRPr>
+        </a:p>
+      </dgm:t>
+    </dgm:pt>
+    <dgm:pt modelId="{12311264-C44B-4886-9BAA-807093E01297}" type="parTrans" cxnId="{7D9B025B-C6E0-4DEC-BDA7-D5A64D037B8F}">
+      <dgm:prSet/>
+      <dgm:spPr/>
+      <dgm:t>
+        <a:bodyPr/>
+        <a:lstStyle/>
+        <a:p>
+          <a:endParaRPr lang="it-IT"/>
+        </a:p>
+      </dgm:t>
+    </dgm:pt>
+    <dgm:pt modelId="{918DF07B-9215-435A-BE5C-E7287899028E}" type="sibTrans" cxnId="{7D9B025B-C6E0-4DEC-BDA7-D5A64D037B8F}">
+      <dgm:prSet/>
+      <dgm:spPr/>
+      <dgm:t>
+        <a:bodyPr/>
+        <a:lstStyle/>
+        <a:p>
+          <a:endParaRPr lang="it-IT"/>
+        </a:p>
+      </dgm:t>
+    </dgm:pt>
     <dgm:pt modelId="{70384AF9-2469-40A9-9592-5AACE7175084}" type="pres">
       <dgm:prSet presAssocID="{2907D13E-4EC4-40B0-8467-CB918CC07E49}" presName="diagram" presStyleCnt="0">
         <dgm:presLayoutVars>
@@ -6421,7 +6551,7 @@
       <dgm:spPr/>
     </dgm:pt>
     <dgm:pt modelId="{2CF7012E-B466-46F9-9A90-1DBC0E5D9CED}" type="pres">
-      <dgm:prSet presAssocID="{16BD56DA-A5C3-4D71-964E-DFA3747BDC42}" presName="LevelOneTextNode" presStyleLbl="node0" presStyleIdx="0" presStyleCnt="2">
+      <dgm:prSet presAssocID="{16BD56DA-A5C3-4D71-964E-DFA3747BDC42}" presName="LevelOneTextNode" presStyleLbl="node0" presStyleIdx="0" presStyleCnt="3" custScaleX="119116" custLinFactNeighborY="4881">
         <dgm:presLayoutVars>
           <dgm:chPref val="3"/>
         </dgm:presLayoutVars>
@@ -6433,11 +6563,11 @@
       <dgm:spPr/>
     </dgm:pt>
     <dgm:pt modelId="{03804EE7-7231-465D-9CF9-5BDB01DAAE5F}" type="pres">
-      <dgm:prSet presAssocID="{B23A9C8E-A442-49A0-A1DD-08F87571E8AC}" presName="conn2-1" presStyleLbl="parChTrans1D2" presStyleIdx="0" presStyleCnt="5"/>
+      <dgm:prSet presAssocID="{B23A9C8E-A442-49A0-A1DD-08F87571E8AC}" presName="conn2-1" presStyleLbl="parChTrans1D2" presStyleIdx="0" presStyleCnt="7"/>
       <dgm:spPr/>
     </dgm:pt>
     <dgm:pt modelId="{3517C650-F6E9-46CA-AAA7-BBA8801DD7D8}" type="pres">
-      <dgm:prSet presAssocID="{B23A9C8E-A442-49A0-A1DD-08F87571E8AC}" presName="connTx" presStyleLbl="parChTrans1D2" presStyleIdx="0" presStyleCnt="5"/>
+      <dgm:prSet presAssocID="{B23A9C8E-A442-49A0-A1DD-08F87571E8AC}" presName="connTx" presStyleLbl="parChTrans1D2" presStyleIdx="0" presStyleCnt="7"/>
       <dgm:spPr/>
     </dgm:pt>
     <dgm:pt modelId="{D66FDCD5-A7B8-448B-9005-8236F7F24363}" type="pres">
@@ -6445,7 +6575,7 @@
       <dgm:spPr/>
     </dgm:pt>
     <dgm:pt modelId="{C9B846E9-182A-45CC-B7A4-0378FD67C97D}" type="pres">
-      <dgm:prSet presAssocID="{AE29E6A4-23C2-460F-9A0E-F9A5B88CBC27}" presName="LevelTwoTextNode" presStyleLbl="node2" presStyleIdx="0" presStyleCnt="5">
+      <dgm:prSet presAssocID="{AE29E6A4-23C2-460F-9A0E-F9A5B88CBC27}" presName="LevelTwoTextNode" presStyleLbl="node2" presStyleIdx="0" presStyleCnt="7" custScaleX="114820">
         <dgm:presLayoutVars>
           <dgm:chPref val="3"/>
         </dgm:presLayoutVars>
@@ -6457,11 +6587,11 @@
       <dgm:spPr/>
     </dgm:pt>
     <dgm:pt modelId="{035EE4C2-BC1C-48EA-B14F-97015996176E}" type="pres">
-      <dgm:prSet presAssocID="{FF6B6338-0E4D-4241-B4C0-A52ACF53BEE1}" presName="conn2-1" presStyleLbl="parChTrans1D2" presStyleIdx="1" presStyleCnt="5"/>
+      <dgm:prSet presAssocID="{FF6B6338-0E4D-4241-B4C0-A52ACF53BEE1}" presName="conn2-1" presStyleLbl="parChTrans1D2" presStyleIdx="1" presStyleCnt="7"/>
       <dgm:spPr/>
     </dgm:pt>
     <dgm:pt modelId="{0D292D21-634A-4B03-A8E6-8F3938B6771C}" type="pres">
-      <dgm:prSet presAssocID="{FF6B6338-0E4D-4241-B4C0-A52ACF53BEE1}" presName="connTx" presStyleLbl="parChTrans1D2" presStyleIdx="1" presStyleCnt="5"/>
+      <dgm:prSet presAssocID="{FF6B6338-0E4D-4241-B4C0-A52ACF53BEE1}" presName="connTx" presStyleLbl="parChTrans1D2" presStyleIdx="1" presStyleCnt="7"/>
       <dgm:spPr/>
     </dgm:pt>
     <dgm:pt modelId="{091FD0E6-FE9C-458F-96E2-43D698D42FE0}" type="pres">
@@ -6469,7 +6599,7 @@
       <dgm:spPr/>
     </dgm:pt>
     <dgm:pt modelId="{19FE825B-36EF-486E-B9CD-C79C9C40DA50}" type="pres">
-      <dgm:prSet presAssocID="{4D036AE4-4B9D-45F3-A25E-2A63FE945EC7}" presName="LevelTwoTextNode" presStyleLbl="node2" presStyleIdx="1" presStyleCnt="5">
+      <dgm:prSet presAssocID="{4D036AE4-4B9D-45F3-A25E-2A63FE945EC7}" presName="LevelTwoTextNode" presStyleLbl="node2" presStyleIdx="1" presStyleCnt="7" custScaleX="114820">
         <dgm:presLayoutVars>
           <dgm:chPref val="3"/>
         </dgm:presLayoutVars>
@@ -6481,11 +6611,11 @@
       <dgm:spPr/>
     </dgm:pt>
     <dgm:pt modelId="{4BB8F76F-A742-4AA0-80B5-EEE513516A6F}" type="pres">
-      <dgm:prSet presAssocID="{4F1BF590-A880-4004-B6C4-E584CD568217}" presName="conn2-1" presStyleLbl="parChTrans1D2" presStyleIdx="2" presStyleCnt="5"/>
+      <dgm:prSet presAssocID="{4F1BF590-A880-4004-B6C4-E584CD568217}" presName="conn2-1" presStyleLbl="parChTrans1D2" presStyleIdx="2" presStyleCnt="7"/>
       <dgm:spPr/>
     </dgm:pt>
     <dgm:pt modelId="{CE107DA2-9886-4CA8-9509-32D5C5A0C9EE}" type="pres">
-      <dgm:prSet presAssocID="{4F1BF590-A880-4004-B6C4-E584CD568217}" presName="connTx" presStyleLbl="parChTrans1D2" presStyleIdx="2" presStyleCnt="5"/>
+      <dgm:prSet presAssocID="{4F1BF590-A880-4004-B6C4-E584CD568217}" presName="connTx" presStyleLbl="parChTrans1D2" presStyleIdx="2" presStyleCnt="7"/>
       <dgm:spPr/>
     </dgm:pt>
     <dgm:pt modelId="{F1E5D28D-8B59-4E96-AC23-41552B47C6BE}" type="pres">
@@ -6493,7 +6623,7 @@
       <dgm:spPr/>
     </dgm:pt>
     <dgm:pt modelId="{833BD415-9A15-4B32-BD5B-6E53EA4F08F6}" type="pres">
-      <dgm:prSet presAssocID="{930FC926-DD4E-44E2-86E3-77E580EA3391}" presName="LevelTwoTextNode" presStyleLbl="node2" presStyleIdx="2" presStyleCnt="5">
+      <dgm:prSet presAssocID="{930FC926-DD4E-44E2-86E3-77E580EA3391}" presName="LevelTwoTextNode" presStyleLbl="node2" presStyleIdx="2" presStyleCnt="7" custScaleX="114820">
         <dgm:presLayoutVars>
           <dgm:chPref val="3"/>
         </dgm:presLayoutVars>
@@ -6509,7 +6639,7 @@
       <dgm:spPr/>
     </dgm:pt>
     <dgm:pt modelId="{16C270DC-FC70-4DC8-BE00-ED4A04DD2D3C}" type="pres">
-      <dgm:prSet presAssocID="{9656E24A-AA75-4BC7-A736-A1C2E45C2F71}" presName="LevelOneTextNode" presStyleLbl="node0" presStyleIdx="1" presStyleCnt="2">
+      <dgm:prSet presAssocID="{9656E24A-AA75-4BC7-A736-A1C2E45C2F71}" presName="LevelOneTextNode" presStyleLbl="node0" presStyleIdx="1" presStyleCnt="3" custScaleX="119116">
         <dgm:presLayoutVars>
           <dgm:chPref val="3"/>
         </dgm:presLayoutVars>
@@ -6521,11 +6651,11 @@
       <dgm:spPr/>
     </dgm:pt>
     <dgm:pt modelId="{8078EAE0-B9E9-4666-A80C-92EEDD5AE56A}" type="pres">
-      <dgm:prSet presAssocID="{8E10D32D-78A1-497D-96FC-A39F14B7A9BB}" presName="conn2-1" presStyleLbl="parChTrans1D2" presStyleIdx="3" presStyleCnt="5"/>
+      <dgm:prSet presAssocID="{8E10D32D-78A1-497D-96FC-A39F14B7A9BB}" presName="conn2-1" presStyleLbl="parChTrans1D2" presStyleIdx="3" presStyleCnt="7"/>
       <dgm:spPr/>
     </dgm:pt>
     <dgm:pt modelId="{2B16BAE9-E20A-46E5-883F-CECDB4ADCFB6}" type="pres">
-      <dgm:prSet presAssocID="{8E10D32D-78A1-497D-96FC-A39F14B7A9BB}" presName="connTx" presStyleLbl="parChTrans1D2" presStyleIdx="3" presStyleCnt="5"/>
+      <dgm:prSet presAssocID="{8E10D32D-78A1-497D-96FC-A39F14B7A9BB}" presName="connTx" presStyleLbl="parChTrans1D2" presStyleIdx="3" presStyleCnt="7"/>
       <dgm:spPr/>
     </dgm:pt>
     <dgm:pt modelId="{DA664B3D-78E5-4FF1-AB56-07312D51A348}" type="pres">
@@ -6533,7 +6663,7 @@
       <dgm:spPr/>
     </dgm:pt>
     <dgm:pt modelId="{F845306D-465B-4847-8FB2-7367739F041A}" type="pres">
-      <dgm:prSet presAssocID="{A0D9DD9E-E6B9-4610-A095-23DE648E060D}" presName="LevelTwoTextNode" presStyleLbl="node2" presStyleIdx="3" presStyleCnt="5">
+      <dgm:prSet presAssocID="{A0D9DD9E-E6B9-4610-A095-23DE648E060D}" presName="LevelTwoTextNode" presStyleLbl="node2" presStyleIdx="3" presStyleCnt="7" custScaleX="114820">
         <dgm:presLayoutVars>
           <dgm:chPref val="3"/>
         </dgm:presLayoutVars>
@@ -6545,11 +6675,11 @@
       <dgm:spPr/>
     </dgm:pt>
     <dgm:pt modelId="{0F8C6668-F8A5-4BC4-82D3-174290CAA838}" type="pres">
-      <dgm:prSet presAssocID="{CE956EEA-CA1F-43F4-B135-E441AE8CFC86}" presName="conn2-1" presStyleLbl="parChTrans1D2" presStyleIdx="4" presStyleCnt="5"/>
+      <dgm:prSet presAssocID="{CE956EEA-CA1F-43F4-B135-E441AE8CFC86}" presName="conn2-1" presStyleLbl="parChTrans1D2" presStyleIdx="4" presStyleCnt="7"/>
       <dgm:spPr/>
     </dgm:pt>
     <dgm:pt modelId="{85A71A1A-078D-4F23-AB1B-9F29CC1B0721}" type="pres">
-      <dgm:prSet presAssocID="{CE956EEA-CA1F-43F4-B135-E441AE8CFC86}" presName="connTx" presStyleLbl="parChTrans1D2" presStyleIdx="4" presStyleCnt="5"/>
+      <dgm:prSet presAssocID="{CE956EEA-CA1F-43F4-B135-E441AE8CFC86}" presName="connTx" presStyleLbl="parChTrans1D2" presStyleIdx="4" presStyleCnt="7"/>
       <dgm:spPr/>
     </dgm:pt>
     <dgm:pt modelId="{ABD766D7-6CDE-4463-B085-85A5CC4E51A0}" type="pres">
@@ -6557,7 +6687,7 @@
       <dgm:spPr/>
     </dgm:pt>
     <dgm:pt modelId="{EF49A9DB-AED3-4C1C-9C1A-6487D238FF60}" type="pres">
-      <dgm:prSet presAssocID="{B8CC19AF-CBA0-4D40-A12B-9D0C9AC96741}" presName="LevelTwoTextNode" presStyleLbl="node2" presStyleIdx="4" presStyleCnt="5">
+      <dgm:prSet presAssocID="{B8CC19AF-CBA0-4D40-A12B-9D0C9AC96741}" presName="LevelTwoTextNode" presStyleLbl="node2" presStyleIdx="4" presStyleCnt="7" custScaleX="114820">
         <dgm:presLayoutVars>
           <dgm:chPref val="3"/>
         </dgm:presLayoutVars>
@@ -6568,18 +6698,89 @@
       <dgm:prSet presAssocID="{B8CC19AF-CBA0-4D40-A12B-9D0C9AC96741}" presName="level3hierChild" presStyleCnt="0"/>
       <dgm:spPr/>
     </dgm:pt>
+    <dgm:pt modelId="{6E6F3BA0-6C10-43B0-8A79-95AA483CE633}" type="pres">
+      <dgm:prSet presAssocID="{B5763AE2-1134-4B67-9EB9-323E7ACD6CD3}" presName="root1" presStyleCnt="0"/>
+      <dgm:spPr/>
+    </dgm:pt>
+    <dgm:pt modelId="{3E57150E-E5F7-4B97-A64A-2D90F99E4700}" type="pres">
+      <dgm:prSet presAssocID="{B5763AE2-1134-4B67-9EB9-323E7ACD6CD3}" presName="LevelOneTextNode" presStyleLbl="node0" presStyleIdx="2" presStyleCnt="3" custScaleX="119116">
+        <dgm:presLayoutVars>
+          <dgm:chPref val="3"/>
+        </dgm:presLayoutVars>
+      </dgm:prSet>
+      <dgm:spPr/>
+    </dgm:pt>
+    <dgm:pt modelId="{BA68115F-EA90-4B5C-AE20-7FCB75D890BD}" type="pres">
+      <dgm:prSet presAssocID="{B5763AE2-1134-4B67-9EB9-323E7ACD6CD3}" presName="level2hierChild" presStyleCnt="0"/>
+      <dgm:spPr/>
+    </dgm:pt>
+    <dgm:pt modelId="{7F909729-4427-4226-B558-989C7B40D670}" type="pres">
+      <dgm:prSet presAssocID="{769C54F0-38BA-417E-A52D-63B918D02982}" presName="conn2-1" presStyleLbl="parChTrans1D2" presStyleIdx="5" presStyleCnt="7"/>
+      <dgm:spPr/>
+    </dgm:pt>
+    <dgm:pt modelId="{7F9D1519-7B75-4CBF-9743-32AA481F0727}" type="pres">
+      <dgm:prSet presAssocID="{769C54F0-38BA-417E-A52D-63B918D02982}" presName="connTx" presStyleLbl="parChTrans1D2" presStyleIdx="5" presStyleCnt="7"/>
+      <dgm:spPr/>
+    </dgm:pt>
+    <dgm:pt modelId="{49A0BE33-4B1B-41B7-A066-0CC0808E0480}" type="pres">
+      <dgm:prSet presAssocID="{A0B5271F-30E6-474C-B554-83F4DA6A2DA8}" presName="root2" presStyleCnt="0"/>
+      <dgm:spPr/>
+    </dgm:pt>
+    <dgm:pt modelId="{664EEAFC-A430-4928-9927-0595E02838A2}" type="pres">
+      <dgm:prSet presAssocID="{A0B5271F-30E6-474C-B554-83F4DA6A2DA8}" presName="LevelTwoTextNode" presStyleLbl="node2" presStyleIdx="5" presStyleCnt="7" custScaleX="114820">
+        <dgm:presLayoutVars>
+          <dgm:chPref val="3"/>
+        </dgm:presLayoutVars>
+      </dgm:prSet>
+      <dgm:spPr/>
+    </dgm:pt>
+    <dgm:pt modelId="{AB18397A-E8DD-4869-9C1C-A67EA9C1D9D9}" type="pres">
+      <dgm:prSet presAssocID="{A0B5271F-30E6-474C-B554-83F4DA6A2DA8}" presName="level3hierChild" presStyleCnt="0"/>
+      <dgm:spPr/>
+    </dgm:pt>
+    <dgm:pt modelId="{A89A3089-8C46-4338-BF73-120FD8D26F94}" type="pres">
+      <dgm:prSet presAssocID="{12311264-C44B-4886-9BAA-807093E01297}" presName="conn2-1" presStyleLbl="parChTrans1D2" presStyleIdx="6" presStyleCnt="7"/>
+      <dgm:spPr/>
+    </dgm:pt>
+    <dgm:pt modelId="{4A3C97A6-ED2D-4965-A602-F2F65B1CC6CD}" type="pres">
+      <dgm:prSet presAssocID="{12311264-C44B-4886-9BAA-807093E01297}" presName="connTx" presStyleLbl="parChTrans1D2" presStyleIdx="6" presStyleCnt="7"/>
+      <dgm:spPr/>
+    </dgm:pt>
+    <dgm:pt modelId="{BCD6E762-C02F-478F-B1BC-995C8E24ADE1}" type="pres">
+      <dgm:prSet presAssocID="{05FC2DDD-8716-4BD0-AD0F-B5E4C40D798F}" presName="root2" presStyleCnt="0"/>
+      <dgm:spPr/>
+    </dgm:pt>
+    <dgm:pt modelId="{660AFEAB-3701-4D14-890E-67426F843685}" type="pres">
+      <dgm:prSet presAssocID="{05FC2DDD-8716-4BD0-AD0F-B5E4C40D798F}" presName="LevelTwoTextNode" presStyleLbl="node2" presStyleIdx="6" presStyleCnt="7" custScaleX="114820">
+        <dgm:presLayoutVars>
+          <dgm:chPref val="3"/>
+        </dgm:presLayoutVars>
+      </dgm:prSet>
+      <dgm:spPr/>
+    </dgm:pt>
+    <dgm:pt modelId="{8AC600EF-EB47-4726-AA2C-E29303C9B3E8}" type="pres">
+      <dgm:prSet presAssocID="{05FC2DDD-8716-4BD0-AD0F-B5E4C40D798F}" presName="level3hierChild" presStyleCnt="0"/>
+      <dgm:spPr/>
+    </dgm:pt>
   </dgm:ptLst>
   <dgm:cxnLst>
     <dgm:cxn modelId="{6AAD7503-44C6-455E-B446-594860E65848}" type="presOf" srcId="{2907D13E-4EC4-40B0-8467-CB918CC07E49}" destId="{70384AF9-2469-40A9-9592-5AACE7175084}" srcOrd="0" destOrd="0" presId="urn:microsoft.com/office/officeart/2005/8/layout/hierarchy2"/>
     <dgm:cxn modelId="{02AD7A06-F4AD-40D3-BDBA-D98E06227214}" type="presOf" srcId="{4F1BF590-A880-4004-B6C4-E584CD568217}" destId="{CE107DA2-9886-4CA8-9509-32D5C5A0C9EE}" srcOrd="1" destOrd="0" presId="urn:microsoft.com/office/officeart/2005/8/layout/hierarchy2"/>
     <dgm:cxn modelId="{D6500B11-D685-40FC-9E3B-EA742C850D36}" type="presOf" srcId="{4D036AE4-4B9D-45F3-A25E-2A63FE945EC7}" destId="{19FE825B-36EF-486E-B9CD-C79C9C40DA50}" srcOrd="0" destOrd="0" presId="urn:microsoft.com/office/officeart/2005/8/layout/hierarchy2"/>
+    <dgm:cxn modelId="{FD27DC1B-8046-4DF8-A5EF-DB73519C4115}" type="presOf" srcId="{769C54F0-38BA-417E-A52D-63B918D02982}" destId="{7F909729-4427-4226-B558-989C7B40D670}" srcOrd="0" destOrd="0" presId="urn:microsoft.com/office/officeart/2005/8/layout/hierarchy2"/>
+    <dgm:cxn modelId="{55438A21-2BD8-479A-B056-F9C7D205D99C}" type="presOf" srcId="{A0B5271F-30E6-474C-B554-83F4DA6A2DA8}" destId="{664EEAFC-A430-4928-9927-0595E02838A2}" srcOrd="0" destOrd="0" presId="urn:microsoft.com/office/officeart/2005/8/layout/hierarchy2"/>
     <dgm:cxn modelId="{0C22CD24-4052-495B-A715-4030A4B1D7AA}" type="presOf" srcId="{B23A9C8E-A442-49A0-A1DD-08F87571E8AC}" destId="{03804EE7-7231-465D-9CF9-5BDB01DAAE5F}" srcOrd="0" destOrd="0" presId="urn:microsoft.com/office/officeart/2005/8/layout/hierarchy2"/>
     <dgm:cxn modelId="{18030928-31F3-4C51-AF16-16B84ECAC317}" type="presOf" srcId="{9656E24A-AA75-4BC7-A736-A1C2E45C2F71}" destId="{16C270DC-FC70-4DC8-BE00-ED4A04DD2D3C}" srcOrd="0" destOrd="0" presId="urn:microsoft.com/office/officeart/2005/8/layout/hierarchy2"/>
     <dgm:cxn modelId="{82AF0D3E-EF95-4FA5-B7E9-353DD7EAF34F}" srcId="{16BD56DA-A5C3-4D71-964E-DFA3747BDC42}" destId="{AE29E6A4-23C2-460F-9A0E-F9A5B88CBC27}" srcOrd="0" destOrd="0" parTransId="{B23A9C8E-A442-49A0-A1DD-08F87571E8AC}" sibTransId="{862847C8-5DAF-44E6-A073-670968E2BB41}"/>
+    <dgm:cxn modelId="{7D9B025B-C6E0-4DEC-BDA7-D5A64D037B8F}" srcId="{B5763AE2-1134-4B67-9EB9-323E7ACD6CD3}" destId="{05FC2DDD-8716-4BD0-AD0F-B5E4C40D798F}" srcOrd="1" destOrd="0" parTransId="{12311264-C44B-4886-9BAA-807093E01297}" sibTransId="{918DF07B-9215-435A-BE5C-E7287899028E}"/>
+    <dgm:cxn modelId="{CE0BF65B-4B4E-4778-95F3-3C90A6CECEC6}" type="presOf" srcId="{12311264-C44B-4886-9BAA-807093E01297}" destId="{A89A3089-8C46-4338-BF73-120FD8D26F94}" srcOrd="0" destOrd="0" presId="urn:microsoft.com/office/officeart/2005/8/layout/hierarchy2"/>
     <dgm:cxn modelId="{9FD48D62-95EE-429D-BF75-38BE94EF217A}" type="presOf" srcId="{B8CC19AF-CBA0-4D40-A12B-9D0C9AC96741}" destId="{EF49A9DB-AED3-4C1C-9C1A-6487D238FF60}" srcOrd="0" destOrd="0" presId="urn:microsoft.com/office/officeart/2005/8/layout/hierarchy2"/>
+    <dgm:cxn modelId="{00887563-94F6-429B-B489-12878D509643}" type="presOf" srcId="{769C54F0-38BA-417E-A52D-63B918D02982}" destId="{7F9D1519-7B75-4CBF-9743-32AA481F0727}" srcOrd="1" destOrd="0" presId="urn:microsoft.com/office/officeart/2005/8/layout/hierarchy2"/>
     <dgm:cxn modelId="{FC32FE6B-92C8-427B-85FA-54D95700C0E3}" type="presOf" srcId="{8E10D32D-78A1-497D-96FC-A39F14B7A9BB}" destId="{8078EAE0-B9E9-4666-A80C-92EEDD5AE56A}" srcOrd="0" destOrd="0" presId="urn:microsoft.com/office/officeart/2005/8/layout/hierarchy2"/>
     <dgm:cxn modelId="{B3BC0F6E-C044-4523-A7EC-1E1DA44D00B4}" srcId="{9656E24A-AA75-4BC7-A736-A1C2E45C2F71}" destId="{A0D9DD9E-E6B9-4610-A095-23DE648E060D}" srcOrd="0" destOrd="0" parTransId="{8E10D32D-78A1-497D-96FC-A39F14B7A9BB}" sibTransId="{B7834B51-C5BB-4809-8D61-06BC369AF978}"/>
     <dgm:cxn modelId="{9899B652-7C91-49DF-8D61-EA3825F37F86}" type="presOf" srcId="{16BD56DA-A5C3-4D71-964E-DFA3747BDC42}" destId="{2CF7012E-B466-46F9-9A90-1DBC0E5D9CED}" srcOrd="0" destOrd="0" presId="urn:microsoft.com/office/officeart/2005/8/layout/hierarchy2"/>
+    <dgm:cxn modelId="{9BE17E5A-1ADC-41EC-82FD-51308520919B}" type="presOf" srcId="{05FC2DDD-8716-4BD0-AD0F-B5E4C40D798F}" destId="{660AFEAB-3701-4D14-890E-67426F843685}" srcOrd="0" destOrd="0" presId="urn:microsoft.com/office/officeart/2005/8/layout/hierarchy2"/>
+    <dgm:cxn modelId="{66F28E7E-9E37-4B57-9168-98A4525AB375}" type="presOf" srcId="{B5763AE2-1134-4B67-9EB9-323E7ACD6CD3}" destId="{3E57150E-E5F7-4B97-A64A-2D90F99E4700}" srcOrd="0" destOrd="0" presId="urn:microsoft.com/office/officeart/2005/8/layout/hierarchy2"/>
     <dgm:cxn modelId="{CC065580-15D1-4BFE-946B-1EDFB563AA3B}" srcId="{9656E24A-AA75-4BC7-A736-A1C2E45C2F71}" destId="{B8CC19AF-CBA0-4D40-A12B-9D0C9AC96741}" srcOrd="1" destOrd="0" parTransId="{CE956EEA-CA1F-43F4-B135-E441AE8CFC86}" sibTransId="{7AB4DE73-5CEF-47BB-B67D-E648FC8A72D2}"/>
     <dgm:cxn modelId="{D39AB983-B94A-40E4-BC91-45D8A9C5C0D2}" type="presOf" srcId="{AE29E6A4-23C2-460F-9A0E-F9A5B88CBC27}" destId="{C9B846E9-182A-45CC-B7A4-0378FD67C97D}" srcOrd="0" destOrd="0" presId="urn:microsoft.com/office/officeart/2005/8/layout/hierarchy2"/>
     <dgm:cxn modelId="{8D37F689-8D9D-4A74-B2BE-BED7347E3F90}" type="presOf" srcId="{930FC926-DD4E-44E2-86E3-77E580EA3391}" destId="{833BD415-9A15-4B32-BD5B-6E53EA4F08F6}" srcOrd="0" destOrd="0" presId="urn:microsoft.com/office/officeart/2005/8/layout/hierarchy2"/>
@@ -6587,9 +6788,12 @@
     <dgm:cxn modelId="{CBB95390-3135-4EEC-AA50-2E2E8FAB2B66}" type="presOf" srcId="{B23A9C8E-A442-49A0-A1DD-08F87571E8AC}" destId="{3517C650-F6E9-46CA-AAA7-BBA8801DD7D8}" srcOrd="1" destOrd="0" presId="urn:microsoft.com/office/officeart/2005/8/layout/hierarchy2"/>
     <dgm:cxn modelId="{C5DE1D94-4105-42C8-B034-EBA9F8E0FCAC}" srcId="{2907D13E-4EC4-40B0-8467-CB918CC07E49}" destId="{16BD56DA-A5C3-4D71-964E-DFA3747BDC42}" srcOrd="0" destOrd="0" parTransId="{61158453-6ADD-4BD9-AA4B-C8B1162DBC6F}" sibTransId="{248657BB-DDC4-475C-BA26-DE403D8C5C56}"/>
     <dgm:cxn modelId="{5C98B0A7-5DF0-4F50-8FE4-F1AD5FB5E844}" srcId="{2907D13E-4EC4-40B0-8467-CB918CC07E49}" destId="{9656E24A-AA75-4BC7-A736-A1C2E45C2F71}" srcOrd="1" destOrd="0" parTransId="{ABDEFC09-D774-4314-8ECF-37421F79CCC4}" sibTransId="{0AC125C2-F76A-48DA-B830-B861A5E8A874}"/>
+    <dgm:cxn modelId="{7CE802B4-E63A-4FE4-A1AF-ADCDED9EAD3D}" srcId="{2907D13E-4EC4-40B0-8467-CB918CC07E49}" destId="{B5763AE2-1134-4B67-9EB9-323E7ACD6CD3}" srcOrd="2" destOrd="0" parTransId="{D0F23480-9490-4F67-BC54-EAA1CF892EE6}" sibTransId="{7AB8DE81-1752-4A53-8DD5-66CA6C433B26}"/>
+    <dgm:cxn modelId="{2417FAC1-1DD0-4AEA-AB97-A44F3C5582E8}" type="presOf" srcId="{12311264-C44B-4886-9BAA-807093E01297}" destId="{4A3C97A6-ED2D-4965-A602-F2F65B1CC6CD}" srcOrd="1" destOrd="0" presId="urn:microsoft.com/office/officeart/2005/8/layout/hierarchy2"/>
     <dgm:cxn modelId="{42AD5ACA-2E57-4391-A3AB-99D701AB3158}" type="presOf" srcId="{FF6B6338-0E4D-4241-B4C0-A52ACF53BEE1}" destId="{0D292D21-634A-4B03-A8E6-8F3938B6771C}" srcOrd="1" destOrd="0" presId="urn:microsoft.com/office/officeart/2005/8/layout/hierarchy2"/>
     <dgm:cxn modelId="{918076D2-D527-4967-BB96-FEA83B97B00C}" type="presOf" srcId="{A0D9DD9E-E6B9-4610-A095-23DE648E060D}" destId="{F845306D-465B-4847-8FB2-7367739F041A}" srcOrd="0" destOrd="0" presId="urn:microsoft.com/office/officeart/2005/8/layout/hierarchy2"/>
     <dgm:cxn modelId="{0441E1D2-9C7D-4248-A53B-B333E4CCCD71}" type="presOf" srcId="{FF6B6338-0E4D-4241-B4C0-A52ACF53BEE1}" destId="{035EE4C2-BC1C-48EA-B14F-97015996176E}" srcOrd="0" destOrd="0" presId="urn:microsoft.com/office/officeart/2005/8/layout/hierarchy2"/>
+    <dgm:cxn modelId="{07001DD5-4487-46BA-A0D0-82C6E0CC001F}" srcId="{B5763AE2-1134-4B67-9EB9-323E7ACD6CD3}" destId="{A0B5271F-30E6-474C-B554-83F4DA6A2DA8}" srcOrd="0" destOrd="0" parTransId="{769C54F0-38BA-417E-A52D-63B918D02982}" sibTransId="{09913088-1E5F-484E-99A8-4A817EA398A8}"/>
     <dgm:cxn modelId="{B378BFDB-F911-46ED-BBD7-0182CD3497E9}" srcId="{16BD56DA-A5C3-4D71-964E-DFA3747BDC42}" destId="{930FC926-DD4E-44E2-86E3-77E580EA3391}" srcOrd="2" destOrd="0" parTransId="{4F1BF590-A880-4004-B6C4-E584CD568217}" sibTransId="{E62F2F42-9444-4B07-8673-89578B3C0BC1}"/>
     <dgm:cxn modelId="{1067EBE9-ED73-4D66-B848-FC638D35CFAF}" type="presOf" srcId="{4F1BF590-A880-4004-B6C4-E584CD568217}" destId="{4BB8F76F-A742-4AA0-80B5-EEE513516A6F}" srcOrd="0" destOrd="0" presId="urn:microsoft.com/office/officeart/2005/8/layout/hierarchy2"/>
     <dgm:cxn modelId="{532600F2-0E12-4F0D-8751-F6E5046D1BE7}" type="presOf" srcId="{8E10D32D-78A1-497D-96FC-A39F14B7A9BB}" destId="{2B16BAE9-E20A-46E5-883F-CECDB4ADCFB6}" srcOrd="1" destOrd="0" presId="urn:microsoft.com/office/officeart/2005/8/layout/hierarchy2"/>
@@ -6626,6 +6830,19 @@
     <dgm:cxn modelId="{A24EFC07-E558-4248-9B4E-C75D3F3F9369}" type="presParOf" srcId="{5B10BBC3-1EB1-4E45-86F6-9EF060358B96}" destId="{ABD766D7-6CDE-4463-B085-85A5CC4E51A0}" srcOrd="3" destOrd="0" presId="urn:microsoft.com/office/officeart/2005/8/layout/hierarchy2"/>
     <dgm:cxn modelId="{37F25378-1852-4DCC-9A38-DE8E0EA479D5}" type="presParOf" srcId="{ABD766D7-6CDE-4463-B085-85A5CC4E51A0}" destId="{EF49A9DB-AED3-4C1C-9C1A-6487D238FF60}" srcOrd="0" destOrd="0" presId="urn:microsoft.com/office/officeart/2005/8/layout/hierarchy2"/>
     <dgm:cxn modelId="{13949D2B-57AA-400D-9960-5797774EB62F}" type="presParOf" srcId="{ABD766D7-6CDE-4463-B085-85A5CC4E51A0}" destId="{316228FC-0555-4AD1-B509-182B32753AC3}" srcOrd="1" destOrd="0" presId="urn:microsoft.com/office/officeart/2005/8/layout/hierarchy2"/>
+    <dgm:cxn modelId="{CE34E5FA-B3DD-4234-9016-697A6F7BA370}" type="presParOf" srcId="{70384AF9-2469-40A9-9592-5AACE7175084}" destId="{6E6F3BA0-6C10-43B0-8A79-95AA483CE633}" srcOrd="2" destOrd="0" presId="urn:microsoft.com/office/officeart/2005/8/layout/hierarchy2"/>
+    <dgm:cxn modelId="{F28A5317-702A-425B-B228-64A287CF1E82}" type="presParOf" srcId="{6E6F3BA0-6C10-43B0-8A79-95AA483CE633}" destId="{3E57150E-E5F7-4B97-A64A-2D90F99E4700}" srcOrd="0" destOrd="0" presId="urn:microsoft.com/office/officeart/2005/8/layout/hierarchy2"/>
+    <dgm:cxn modelId="{0113A424-0004-4AE9-9111-477FD4C304D7}" type="presParOf" srcId="{6E6F3BA0-6C10-43B0-8A79-95AA483CE633}" destId="{BA68115F-EA90-4B5C-AE20-7FCB75D890BD}" srcOrd="1" destOrd="0" presId="urn:microsoft.com/office/officeart/2005/8/layout/hierarchy2"/>
+    <dgm:cxn modelId="{F3263051-0E9B-42F5-949A-6377123A8CCF}" type="presParOf" srcId="{BA68115F-EA90-4B5C-AE20-7FCB75D890BD}" destId="{7F909729-4427-4226-B558-989C7B40D670}" srcOrd="0" destOrd="0" presId="urn:microsoft.com/office/officeart/2005/8/layout/hierarchy2"/>
+    <dgm:cxn modelId="{8D2E74FE-E211-4D00-AEC6-5B63B193E486}" type="presParOf" srcId="{7F909729-4427-4226-B558-989C7B40D670}" destId="{7F9D1519-7B75-4CBF-9743-32AA481F0727}" srcOrd="0" destOrd="0" presId="urn:microsoft.com/office/officeart/2005/8/layout/hierarchy2"/>
+    <dgm:cxn modelId="{8B70AA5E-A403-4B7A-BD03-90831F3D52D7}" type="presParOf" srcId="{BA68115F-EA90-4B5C-AE20-7FCB75D890BD}" destId="{49A0BE33-4B1B-41B7-A066-0CC0808E0480}" srcOrd="1" destOrd="0" presId="urn:microsoft.com/office/officeart/2005/8/layout/hierarchy2"/>
+    <dgm:cxn modelId="{2916D521-3A65-4993-9501-EB9A51B95B6B}" type="presParOf" srcId="{49A0BE33-4B1B-41B7-A066-0CC0808E0480}" destId="{664EEAFC-A430-4928-9927-0595E02838A2}" srcOrd="0" destOrd="0" presId="urn:microsoft.com/office/officeart/2005/8/layout/hierarchy2"/>
+    <dgm:cxn modelId="{58D8F3AF-3C6A-4107-A589-D2A6103972C4}" type="presParOf" srcId="{49A0BE33-4B1B-41B7-A066-0CC0808E0480}" destId="{AB18397A-E8DD-4869-9C1C-A67EA9C1D9D9}" srcOrd="1" destOrd="0" presId="urn:microsoft.com/office/officeart/2005/8/layout/hierarchy2"/>
+    <dgm:cxn modelId="{96C1316A-82C3-4291-A900-5DE05831DA20}" type="presParOf" srcId="{BA68115F-EA90-4B5C-AE20-7FCB75D890BD}" destId="{A89A3089-8C46-4338-BF73-120FD8D26F94}" srcOrd="2" destOrd="0" presId="urn:microsoft.com/office/officeart/2005/8/layout/hierarchy2"/>
+    <dgm:cxn modelId="{51B877F1-5F2A-4F05-8165-DC6DE4C74044}" type="presParOf" srcId="{A89A3089-8C46-4338-BF73-120FD8D26F94}" destId="{4A3C97A6-ED2D-4965-A602-F2F65B1CC6CD}" srcOrd="0" destOrd="0" presId="urn:microsoft.com/office/officeart/2005/8/layout/hierarchy2"/>
+    <dgm:cxn modelId="{3655F4A3-2829-429C-9BB0-A72FE27A748F}" type="presParOf" srcId="{BA68115F-EA90-4B5C-AE20-7FCB75D890BD}" destId="{BCD6E762-C02F-478F-B1BC-995C8E24ADE1}" srcOrd="3" destOrd="0" presId="urn:microsoft.com/office/officeart/2005/8/layout/hierarchy2"/>
+    <dgm:cxn modelId="{6F250D16-7E07-4D78-84B3-396CC892B57D}" type="presParOf" srcId="{BCD6E762-C02F-478F-B1BC-995C8E24ADE1}" destId="{660AFEAB-3701-4D14-890E-67426F843685}" srcOrd="0" destOrd="0" presId="urn:microsoft.com/office/officeart/2005/8/layout/hierarchy2"/>
+    <dgm:cxn modelId="{D74410C1-6900-4980-A001-D1653CC94E8C}" type="presParOf" srcId="{BCD6E762-C02F-478F-B1BC-995C8E24ADE1}" destId="{8AC600EF-EB47-4726-AA2C-E29303C9B3E8}" srcOrd="1" destOrd="0" presId="urn:microsoft.com/office/officeart/2005/8/layout/hierarchy2"/>
   </dgm:cxnLst>
   <dgm:bg/>
   <dgm:whole/>
@@ -9188,8 +9405,8 @@
       </dsp:nvSpPr>
       <dsp:spPr>
         <a:xfrm>
-          <a:off x="1010441" y="1325088"/>
-          <a:ext cx="2301216" cy="1150608"/>
+          <a:off x="1540566" y="982621"/>
+          <a:ext cx="1940508" cy="814545"/>
         </a:xfrm>
         <a:prstGeom prst="roundRect">
           <a:avLst>
@@ -9273,8 +9490,8 @@
         </a:p>
       </dsp:txBody>
       <dsp:txXfrm>
-        <a:off x="1044141" y="1358788"/>
-        <a:ext cx="2233816" cy="1083208"/>
+        <a:off x="1564423" y="1006478"/>
+        <a:ext cx="1892794" cy="766831"/>
       </dsp:txXfrm>
     </dsp:sp>
     <dsp:sp modelId="{03804EE7-7231-465D-9CF9-5BDB01DAAE5F}">
@@ -9283,9 +9500,9 @@
         <dsp:cNvSpPr/>
       </dsp:nvSpPr>
       <dsp:spPr>
-        <a:xfrm rot="18289469">
-          <a:off x="2965961" y="1222730"/>
-          <a:ext cx="1611878" cy="32124"/>
+        <a:xfrm rot="18222979">
+          <a:off x="3219919" y="890280"/>
+          <a:ext cx="1173948" cy="22741"/>
         </a:xfrm>
         <a:custGeom>
           <a:avLst/>
@@ -9296,10 +9513,10 @@
           <a:pathLst>
             <a:path>
               <a:moveTo>
-                <a:pt x="0" y="16062"/>
+                <a:pt x="0" y="11370"/>
               </a:moveTo>
               <a:lnTo>
-                <a:pt x="1611878" y="16062"/>
+                <a:pt x="1173948" y="11370"/>
               </a:lnTo>
             </a:path>
           </a:pathLst>
@@ -9356,8 +9573,8 @@
         </a:p>
       </dsp:txBody>
       <dsp:txXfrm>
-        <a:off x="3731603" y="1198495"/>
-        <a:ext cx="80593" cy="80593"/>
+        <a:off x="3777544" y="872302"/>
+        <a:ext cx="58697" cy="58697"/>
       </dsp:txXfrm>
     </dsp:sp>
     <dsp:sp modelId="{C9B846E9-182A-45CC-B7A4-0378FD67C97D}">
@@ -9367,8 +9584,8 @@
       </dsp:nvSpPr>
       <dsp:spPr>
         <a:xfrm>
-          <a:off x="4232143" y="1888"/>
-          <a:ext cx="2301216" cy="1150608"/>
+          <a:off x="4132711" y="6135"/>
+          <a:ext cx="1870522" cy="814545"/>
         </a:xfrm>
         <a:prstGeom prst="roundRect">
           <a:avLst>
@@ -9444,8 +9661,8 @@
         </a:p>
       </dsp:txBody>
       <dsp:txXfrm>
-        <a:off x="4265843" y="35588"/>
-        <a:ext cx="2233816" cy="1083208"/>
+        <a:off x="4156568" y="29992"/>
+        <a:ext cx="1822808" cy="766831"/>
       </dsp:txXfrm>
     </dsp:sp>
     <dsp:sp modelId="{035EE4C2-BC1C-48EA-B14F-97015996176E}">
@@ -9454,9 +9671,9 @@
         <dsp:cNvSpPr/>
       </dsp:nvSpPr>
       <dsp:spPr>
-        <a:xfrm>
-          <a:off x="3311657" y="1884330"/>
-          <a:ext cx="920486" cy="32124"/>
+        <a:xfrm rot="21390514">
+          <a:off x="3480469" y="1358644"/>
+          <a:ext cx="652848" cy="22741"/>
         </a:xfrm>
         <a:custGeom>
           <a:avLst/>
@@ -9467,10 +9684,10 @@
           <a:pathLst>
             <a:path>
               <a:moveTo>
-                <a:pt x="0" y="16062"/>
+                <a:pt x="0" y="11370"/>
               </a:moveTo>
               <a:lnTo>
-                <a:pt x="920486" y="16062"/>
+                <a:pt x="652848" y="11370"/>
               </a:lnTo>
             </a:path>
           </a:pathLst>
@@ -9527,8 +9744,8 @@
         </a:p>
       </dsp:txBody>
       <dsp:txXfrm>
-        <a:off x="3748888" y="1877380"/>
-        <a:ext cx="46024" cy="46024"/>
+        <a:off x="3790572" y="1353694"/>
+        <a:ext cx="32642" cy="32642"/>
       </dsp:txXfrm>
     </dsp:sp>
     <dsp:sp modelId="{19FE825B-36EF-486E-B9CD-C79C9C40DA50}">
@@ -9538,8 +9755,8 @@
       </dsp:nvSpPr>
       <dsp:spPr>
         <a:xfrm>
-          <a:off x="4232143" y="1325088"/>
-          <a:ext cx="2301216" cy="1150608"/>
+          <a:off x="4132711" y="942863"/>
+          <a:ext cx="1870522" cy="814545"/>
         </a:xfrm>
         <a:prstGeom prst="roundRect">
           <a:avLst>
@@ -9615,8 +9832,8 @@
         </a:p>
       </dsp:txBody>
       <dsp:txXfrm>
-        <a:off x="4265843" y="1358788"/>
-        <a:ext cx="2233816" cy="1083208"/>
+        <a:off x="4156568" y="966720"/>
+        <a:ext cx="1822808" cy="766831"/>
       </dsp:txXfrm>
     </dsp:sp>
     <dsp:sp modelId="{4BB8F76F-A742-4AA0-80B5-EEE513516A6F}">
@@ -9625,9 +9842,9 @@
         <dsp:cNvSpPr/>
       </dsp:nvSpPr>
       <dsp:spPr>
-        <a:xfrm rot="3310531">
-          <a:off x="2965961" y="2545929"/>
-          <a:ext cx="1611878" cy="32124"/>
+        <a:xfrm rot="3240125">
+          <a:off x="3252550" y="1827008"/>
+          <a:ext cx="1108686" cy="22741"/>
         </a:xfrm>
         <a:custGeom>
           <a:avLst/>
@@ -9638,10 +9855,10 @@
           <a:pathLst>
             <a:path>
               <a:moveTo>
-                <a:pt x="0" y="16062"/>
+                <a:pt x="0" y="11370"/>
               </a:moveTo>
               <a:lnTo>
-                <a:pt x="1611878" y="16062"/>
+                <a:pt x="1108686" y="11370"/>
               </a:lnTo>
             </a:path>
           </a:pathLst>
@@ -9698,8 +9915,8 @@
         </a:p>
       </dsp:txBody>
       <dsp:txXfrm>
-        <a:off x="3731603" y="2521694"/>
-        <a:ext cx="80593" cy="80593"/>
+        <a:off x="3779176" y="1810661"/>
+        <a:ext cx="55434" cy="55434"/>
       </dsp:txXfrm>
     </dsp:sp>
     <dsp:sp modelId="{833BD415-9A15-4B32-BD5B-6E53EA4F08F6}">
@@ -9709,8 +9926,8 @@
       </dsp:nvSpPr>
       <dsp:spPr>
         <a:xfrm>
-          <a:off x="4232143" y="2648287"/>
-          <a:ext cx="2301216" cy="1150608"/>
+          <a:off x="4132711" y="1879590"/>
+          <a:ext cx="1870522" cy="814545"/>
         </a:xfrm>
         <a:prstGeom prst="roundRect">
           <a:avLst>
@@ -9786,8 +10003,8 @@
         </a:p>
       </dsp:txBody>
       <dsp:txXfrm>
-        <a:off x="4265843" y="2681987"/>
-        <a:ext cx="2233816" cy="1083208"/>
+        <a:off x="4156568" y="1903447"/>
+        <a:ext cx="1822808" cy="766831"/>
       </dsp:txXfrm>
     </dsp:sp>
     <dsp:sp modelId="{16C270DC-FC70-4DC8-BE00-ED4A04DD2D3C}">
@@ -9797,8 +10014,8 @@
       </dsp:nvSpPr>
       <dsp:spPr>
         <a:xfrm>
-          <a:off x="1010441" y="4633086"/>
-          <a:ext cx="2301216" cy="1150608"/>
+          <a:off x="1540566" y="3284682"/>
+          <a:ext cx="1940508" cy="814545"/>
         </a:xfrm>
         <a:prstGeom prst="roundRect">
           <a:avLst>
@@ -9874,8 +10091,8 @@
         </a:p>
       </dsp:txBody>
       <dsp:txXfrm>
-        <a:off x="1044141" y="4666786"/>
-        <a:ext cx="2233816" cy="1083208"/>
+        <a:off x="1564423" y="3308539"/>
+        <a:ext cx="1892794" cy="766831"/>
       </dsp:txXfrm>
     </dsp:sp>
     <dsp:sp modelId="{8078EAE0-B9E9-4666-A80C-92EEDD5AE56A}">
@@ -9885,8 +10102,8 @@
       </dsp:nvSpPr>
       <dsp:spPr>
         <a:xfrm rot="19457599">
-          <a:off x="3205109" y="4861528"/>
-          <a:ext cx="1133582" cy="32124"/>
+          <a:off x="3405646" y="3446402"/>
+          <a:ext cx="802492" cy="22741"/>
         </a:xfrm>
         <a:custGeom>
           <a:avLst/>
@@ -9897,10 +10114,10 @@
           <a:pathLst>
             <a:path>
               <a:moveTo>
-                <a:pt x="0" y="16062"/>
+                <a:pt x="0" y="11370"/>
               </a:moveTo>
               <a:lnTo>
-                <a:pt x="1133582" y="16062"/>
+                <a:pt x="802492" y="11370"/>
               </a:lnTo>
             </a:path>
           </a:pathLst>
@@ -9957,8 +10174,8 @@
         </a:p>
       </dsp:txBody>
       <dsp:txXfrm>
-        <a:off x="3743560" y="4849251"/>
-        <a:ext cx="56679" cy="56679"/>
+        <a:off x="3786831" y="3437711"/>
+        <a:ext cx="40124" cy="40124"/>
       </dsp:txXfrm>
     </dsp:sp>
     <dsp:sp modelId="{F845306D-465B-4847-8FB2-7367739F041A}">
@@ -9968,8 +10185,8 @@
       </dsp:nvSpPr>
       <dsp:spPr>
         <a:xfrm>
-          <a:off x="4232143" y="3971486"/>
-          <a:ext cx="2301216" cy="1150608"/>
+          <a:off x="4132711" y="2816318"/>
+          <a:ext cx="1870522" cy="814545"/>
         </a:xfrm>
         <a:prstGeom prst="roundRect">
           <a:avLst>
@@ -10045,8 +10262,8 @@
         </a:p>
       </dsp:txBody>
       <dsp:txXfrm>
-        <a:off x="4265843" y="4005186"/>
-        <a:ext cx="2233816" cy="1083208"/>
+        <a:off x="4156568" y="2840175"/>
+        <a:ext cx="1822808" cy="766831"/>
       </dsp:txXfrm>
     </dsp:sp>
     <dsp:sp modelId="{0F8C6668-F8A5-4BC4-82D3-174290CAA838}">
@@ -10056,8 +10273,8 @@
       </dsp:nvSpPr>
       <dsp:spPr>
         <a:xfrm rot="2142401">
-          <a:off x="3205109" y="5523128"/>
-          <a:ext cx="1133582" cy="32124"/>
+          <a:off x="3405646" y="3914766"/>
+          <a:ext cx="802492" cy="22741"/>
         </a:xfrm>
         <a:custGeom>
           <a:avLst/>
@@ -10068,10 +10285,10 @@
           <a:pathLst>
             <a:path>
               <a:moveTo>
-                <a:pt x="0" y="16062"/>
+                <a:pt x="0" y="11370"/>
               </a:moveTo>
               <a:lnTo>
-                <a:pt x="1133582" y="16062"/>
+                <a:pt x="802492" y="11370"/>
               </a:lnTo>
             </a:path>
           </a:pathLst>
@@ -10128,8 +10345,8 @@
         </a:p>
       </dsp:txBody>
       <dsp:txXfrm>
-        <a:off x="3743560" y="5510850"/>
-        <a:ext cx="56679" cy="56679"/>
+        <a:off x="3786831" y="3906074"/>
+        <a:ext cx="40124" cy="40124"/>
       </dsp:txXfrm>
     </dsp:sp>
     <dsp:sp modelId="{EF49A9DB-AED3-4C1C-9C1A-6487D238FF60}">
@@ -10139,8 +10356,8 @@
       </dsp:nvSpPr>
       <dsp:spPr>
         <a:xfrm>
-          <a:off x="4232143" y="5294686"/>
-          <a:ext cx="2301216" cy="1150608"/>
+          <a:off x="4132711" y="3753046"/>
+          <a:ext cx="1870522" cy="814545"/>
         </a:xfrm>
         <a:prstGeom prst="roundRect">
           <a:avLst>
@@ -10216,8 +10433,425 @@
         </a:p>
       </dsp:txBody>
       <dsp:txXfrm>
-        <a:off x="4265843" y="5328386"/>
-        <a:ext cx="2233816" cy="1083208"/>
+        <a:off x="4156568" y="3776903"/>
+        <a:ext cx="1822808" cy="766831"/>
+      </dsp:txXfrm>
+    </dsp:sp>
+    <dsp:sp modelId="{3E57150E-E5F7-4B97-A64A-2D90F99E4700}">
+      <dsp:nvSpPr>
+        <dsp:cNvPr id="0" name=""/>
+        <dsp:cNvSpPr/>
+      </dsp:nvSpPr>
+      <dsp:spPr>
+        <a:xfrm>
+          <a:off x="1540566" y="5158137"/>
+          <a:ext cx="1940508" cy="814545"/>
+        </a:xfrm>
+        <a:prstGeom prst="roundRect">
+          <a:avLst>
+            <a:gd name="adj" fmla="val 10000"/>
+          </a:avLst>
+        </a:prstGeom>
+        <a:solidFill>
+          <a:schemeClr val="accent2">
+            <a:hueOff val="0"/>
+            <a:satOff val="0"/>
+            <a:lumOff val="0"/>
+            <a:alphaOff val="0"/>
+          </a:schemeClr>
+        </a:solidFill>
+        <a:ln w="15875" cap="flat" cmpd="sng" algn="ctr">
+          <a:solidFill>
+            <a:schemeClr val="lt1">
+              <a:hueOff val="0"/>
+              <a:satOff val="0"/>
+              <a:lumOff val="0"/>
+              <a:alphaOff val="0"/>
+            </a:schemeClr>
+          </a:solidFill>
+          <a:prstDash val="solid"/>
+        </a:ln>
+        <a:effectLst/>
+      </dsp:spPr>
+      <dsp:style>
+        <a:lnRef idx="2">
+          <a:scrgbClr r="0" g="0" b="0"/>
+        </a:lnRef>
+        <a:fillRef idx="1">
+          <a:scrgbClr r="0" g="0" b="0"/>
+        </a:fillRef>
+        <a:effectRef idx="0">
+          <a:scrgbClr r="0" g="0" b="0"/>
+        </a:effectRef>
+        <a:fontRef idx="minor">
+          <a:schemeClr val="lt1"/>
+        </a:fontRef>
+      </dsp:style>
+      <dsp:txBody>
+        <a:bodyPr spcFirstLastPara="0" vert="horz" wrap="square" lIns="11430" tIns="11430" rIns="11430" bIns="11430" numCol="1" spcCol="1270" anchor="ctr" anchorCtr="0">
+          <a:noAutofit/>
+        </a:bodyPr>
+        <a:lstStyle/>
+        <a:p>
+          <a:pPr marL="0" lvl="0" indent="0" algn="ctr" defTabSz="800100">
+            <a:lnSpc>
+              <a:spcPct val="90000"/>
+            </a:lnSpc>
+            <a:spcBef>
+              <a:spcPct val="0"/>
+            </a:spcBef>
+            <a:spcAft>
+              <a:spcPct val="35000"/>
+            </a:spcAft>
+            <a:buNone/>
+          </a:pPr>
+          <a:r>
+            <a:rPr lang="en-US" sz="1800" kern="1200" dirty="0">
+              <a:solidFill>
+                <a:schemeClr val="tx1"/>
+              </a:solidFill>
+            </a:rPr>
+            <a:t>Extra</a:t>
+          </a:r>
+        </a:p>
+      </dsp:txBody>
+      <dsp:txXfrm>
+        <a:off x="1564423" y="5181994"/>
+        <a:ext cx="1892794" cy="766831"/>
+      </dsp:txXfrm>
+    </dsp:sp>
+    <dsp:sp modelId="{7F909729-4427-4226-B558-989C7B40D670}">
+      <dsp:nvSpPr>
+        <dsp:cNvPr id="0" name=""/>
+        <dsp:cNvSpPr/>
+      </dsp:nvSpPr>
+      <dsp:spPr>
+        <a:xfrm rot="19457599">
+          <a:off x="3405646" y="5319857"/>
+          <a:ext cx="802492" cy="22741"/>
+        </a:xfrm>
+        <a:custGeom>
+          <a:avLst/>
+          <a:gdLst/>
+          <a:ahLst/>
+          <a:cxnLst/>
+          <a:rect l="0" t="0" r="0" b="0"/>
+          <a:pathLst>
+            <a:path>
+              <a:moveTo>
+                <a:pt x="0" y="11370"/>
+              </a:moveTo>
+              <a:lnTo>
+                <a:pt x="802492" y="11370"/>
+              </a:lnTo>
+            </a:path>
+          </a:pathLst>
+        </a:custGeom>
+        <a:noFill/>
+        <a:ln w="15875" cap="flat" cmpd="sng" algn="ctr">
+          <a:solidFill>
+            <a:schemeClr val="accent4">
+              <a:hueOff val="0"/>
+              <a:satOff val="0"/>
+              <a:lumOff val="0"/>
+              <a:alphaOff val="0"/>
+            </a:schemeClr>
+          </a:solidFill>
+          <a:prstDash val="solid"/>
+        </a:ln>
+        <a:effectLst/>
+      </dsp:spPr>
+      <dsp:style>
+        <a:lnRef idx="2">
+          <a:scrgbClr r="0" g="0" b="0"/>
+        </a:lnRef>
+        <a:fillRef idx="0">
+          <a:scrgbClr r="0" g="0" b="0"/>
+        </a:fillRef>
+        <a:effectRef idx="0">
+          <a:scrgbClr r="0" g="0" b="0"/>
+        </a:effectRef>
+        <a:fontRef idx="minor"/>
+      </dsp:style>
+      <dsp:txBody>
+        <a:bodyPr spcFirstLastPara="0" vert="horz" wrap="square" lIns="12700" tIns="0" rIns="12700" bIns="0" numCol="1" spcCol="1270" anchor="ctr" anchorCtr="0">
+          <a:noAutofit/>
+        </a:bodyPr>
+        <a:lstStyle/>
+        <a:p>
+          <a:pPr marL="0" lvl="0" indent="0" algn="ctr" defTabSz="222250">
+            <a:lnSpc>
+              <a:spcPct val="90000"/>
+            </a:lnSpc>
+            <a:spcBef>
+              <a:spcPct val="0"/>
+            </a:spcBef>
+            <a:spcAft>
+              <a:spcPct val="35000"/>
+            </a:spcAft>
+            <a:buNone/>
+          </a:pPr>
+          <a:endParaRPr lang="it-IT" sz="500" kern="1200"/>
+        </a:p>
+      </dsp:txBody>
+      <dsp:txXfrm>
+        <a:off x="3786831" y="5311166"/>
+        <a:ext cx="40124" cy="40124"/>
+      </dsp:txXfrm>
+    </dsp:sp>
+    <dsp:sp modelId="{664EEAFC-A430-4928-9927-0595E02838A2}">
+      <dsp:nvSpPr>
+        <dsp:cNvPr id="0" name=""/>
+        <dsp:cNvSpPr/>
+      </dsp:nvSpPr>
+      <dsp:spPr>
+        <a:xfrm>
+          <a:off x="4132711" y="4689773"/>
+          <a:ext cx="1870522" cy="814545"/>
+        </a:xfrm>
+        <a:prstGeom prst="roundRect">
+          <a:avLst>
+            <a:gd name="adj" fmla="val 10000"/>
+          </a:avLst>
+        </a:prstGeom>
+        <a:solidFill>
+          <a:schemeClr val="accent4">
+            <a:hueOff val="0"/>
+            <a:satOff val="0"/>
+            <a:lumOff val="0"/>
+            <a:alphaOff val="0"/>
+          </a:schemeClr>
+        </a:solidFill>
+        <a:ln w="15875" cap="flat" cmpd="sng" algn="ctr">
+          <a:solidFill>
+            <a:schemeClr val="lt1">
+              <a:hueOff val="0"/>
+              <a:satOff val="0"/>
+              <a:lumOff val="0"/>
+              <a:alphaOff val="0"/>
+            </a:schemeClr>
+          </a:solidFill>
+          <a:prstDash val="solid"/>
+        </a:ln>
+        <a:effectLst/>
+      </dsp:spPr>
+      <dsp:style>
+        <a:lnRef idx="2">
+          <a:scrgbClr r="0" g="0" b="0"/>
+        </a:lnRef>
+        <a:fillRef idx="1">
+          <a:scrgbClr r="0" g="0" b="0"/>
+        </a:fillRef>
+        <a:effectRef idx="0">
+          <a:scrgbClr r="0" g="0" b="0"/>
+        </a:effectRef>
+        <a:fontRef idx="minor">
+          <a:schemeClr val="lt1"/>
+        </a:fontRef>
+      </dsp:style>
+      <dsp:txBody>
+        <a:bodyPr spcFirstLastPara="0" vert="horz" wrap="square" lIns="11430" tIns="11430" rIns="11430" bIns="11430" numCol="1" spcCol="1270" anchor="ctr" anchorCtr="0">
+          <a:noAutofit/>
+        </a:bodyPr>
+        <a:lstStyle/>
+        <a:p>
+          <a:pPr marL="0" lvl="0" indent="0" algn="ctr" defTabSz="800100">
+            <a:lnSpc>
+              <a:spcPct val="90000"/>
+            </a:lnSpc>
+            <a:spcBef>
+              <a:spcPct val="0"/>
+            </a:spcBef>
+            <a:spcAft>
+              <a:spcPct val="35000"/>
+            </a:spcAft>
+            <a:buNone/>
+          </a:pPr>
+          <a:r>
+            <a:rPr lang="en-US" sz="1800" kern="1200" dirty="0" err="1">
+              <a:solidFill>
+                <a:schemeClr val="tx1"/>
+              </a:solidFill>
+            </a:rPr>
+            <a:t>Classifica</a:t>
+          </a:r>
+          <a:endParaRPr lang="en-US" sz="1800" kern="1200" dirty="0">
+            <a:solidFill>
+              <a:schemeClr val="tx1"/>
+            </a:solidFill>
+          </a:endParaRPr>
+        </a:p>
+      </dsp:txBody>
+      <dsp:txXfrm>
+        <a:off x="4156568" y="4713630"/>
+        <a:ext cx="1822808" cy="766831"/>
+      </dsp:txXfrm>
+    </dsp:sp>
+    <dsp:sp modelId="{A89A3089-8C46-4338-BF73-120FD8D26F94}">
+      <dsp:nvSpPr>
+        <dsp:cNvPr id="0" name=""/>
+        <dsp:cNvSpPr/>
+      </dsp:nvSpPr>
+      <dsp:spPr>
+        <a:xfrm rot="2142401">
+          <a:off x="3405646" y="5788221"/>
+          <a:ext cx="802492" cy="22741"/>
+        </a:xfrm>
+        <a:custGeom>
+          <a:avLst/>
+          <a:gdLst/>
+          <a:ahLst/>
+          <a:cxnLst/>
+          <a:rect l="0" t="0" r="0" b="0"/>
+          <a:pathLst>
+            <a:path>
+              <a:moveTo>
+                <a:pt x="0" y="11370"/>
+              </a:moveTo>
+              <a:lnTo>
+                <a:pt x="802492" y="11370"/>
+              </a:lnTo>
+            </a:path>
+          </a:pathLst>
+        </a:custGeom>
+        <a:noFill/>
+        <a:ln w="15875" cap="flat" cmpd="sng" algn="ctr">
+          <a:solidFill>
+            <a:schemeClr val="accent4">
+              <a:hueOff val="0"/>
+              <a:satOff val="0"/>
+              <a:lumOff val="0"/>
+              <a:alphaOff val="0"/>
+            </a:schemeClr>
+          </a:solidFill>
+          <a:prstDash val="solid"/>
+        </a:ln>
+        <a:effectLst/>
+      </dsp:spPr>
+      <dsp:style>
+        <a:lnRef idx="2">
+          <a:scrgbClr r="0" g="0" b="0"/>
+        </a:lnRef>
+        <a:fillRef idx="0">
+          <a:scrgbClr r="0" g="0" b="0"/>
+        </a:fillRef>
+        <a:effectRef idx="0">
+          <a:scrgbClr r="0" g="0" b="0"/>
+        </a:effectRef>
+        <a:fontRef idx="minor"/>
+      </dsp:style>
+      <dsp:txBody>
+        <a:bodyPr spcFirstLastPara="0" vert="horz" wrap="square" lIns="12700" tIns="0" rIns="12700" bIns="0" numCol="1" spcCol="1270" anchor="ctr" anchorCtr="0">
+          <a:noAutofit/>
+        </a:bodyPr>
+        <a:lstStyle/>
+        <a:p>
+          <a:pPr marL="0" lvl="0" indent="0" algn="ctr" defTabSz="222250">
+            <a:lnSpc>
+              <a:spcPct val="90000"/>
+            </a:lnSpc>
+            <a:spcBef>
+              <a:spcPct val="0"/>
+            </a:spcBef>
+            <a:spcAft>
+              <a:spcPct val="35000"/>
+            </a:spcAft>
+            <a:buNone/>
+          </a:pPr>
+          <a:endParaRPr lang="it-IT" sz="500" kern="1200"/>
+        </a:p>
+      </dsp:txBody>
+      <dsp:txXfrm>
+        <a:off x="3786831" y="5779530"/>
+        <a:ext cx="40124" cy="40124"/>
+      </dsp:txXfrm>
+    </dsp:sp>
+    <dsp:sp modelId="{660AFEAB-3701-4D14-890E-67426F843685}">
+      <dsp:nvSpPr>
+        <dsp:cNvPr id="0" name=""/>
+        <dsp:cNvSpPr/>
+      </dsp:nvSpPr>
+      <dsp:spPr>
+        <a:xfrm>
+          <a:off x="4132711" y="5626501"/>
+          <a:ext cx="1870522" cy="814545"/>
+        </a:xfrm>
+        <a:prstGeom prst="roundRect">
+          <a:avLst>
+            <a:gd name="adj" fmla="val 10000"/>
+          </a:avLst>
+        </a:prstGeom>
+        <a:solidFill>
+          <a:schemeClr val="accent4">
+            <a:hueOff val="0"/>
+            <a:satOff val="0"/>
+            <a:lumOff val="0"/>
+            <a:alphaOff val="0"/>
+          </a:schemeClr>
+        </a:solidFill>
+        <a:ln w="15875" cap="flat" cmpd="sng" algn="ctr">
+          <a:solidFill>
+            <a:schemeClr val="lt1">
+              <a:hueOff val="0"/>
+              <a:satOff val="0"/>
+              <a:lumOff val="0"/>
+              <a:alphaOff val="0"/>
+            </a:schemeClr>
+          </a:solidFill>
+          <a:prstDash val="solid"/>
+        </a:ln>
+        <a:effectLst/>
+      </dsp:spPr>
+      <dsp:style>
+        <a:lnRef idx="2">
+          <a:scrgbClr r="0" g="0" b="0"/>
+        </a:lnRef>
+        <a:fillRef idx="1">
+          <a:scrgbClr r="0" g="0" b="0"/>
+        </a:fillRef>
+        <a:effectRef idx="0">
+          <a:scrgbClr r="0" g="0" b="0"/>
+        </a:effectRef>
+        <a:fontRef idx="minor">
+          <a:schemeClr val="lt1"/>
+        </a:fontRef>
+      </dsp:style>
+      <dsp:txBody>
+        <a:bodyPr spcFirstLastPara="0" vert="horz" wrap="square" lIns="11430" tIns="11430" rIns="11430" bIns="11430" numCol="1" spcCol="1270" anchor="ctr" anchorCtr="0">
+          <a:noAutofit/>
+        </a:bodyPr>
+        <a:lstStyle/>
+        <a:p>
+          <a:pPr marL="0" lvl="0" indent="0" algn="ctr" defTabSz="800100">
+            <a:lnSpc>
+              <a:spcPct val="90000"/>
+            </a:lnSpc>
+            <a:spcBef>
+              <a:spcPct val="0"/>
+            </a:spcBef>
+            <a:spcAft>
+              <a:spcPct val="35000"/>
+            </a:spcAft>
+            <a:buNone/>
+          </a:pPr>
+          <a:r>
+            <a:rPr lang="en-US" sz="1800" kern="1200" dirty="0" err="1">
+              <a:solidFill>
+                <a:schemeClr val="tx1"/>
+              </a:solidFill>
+            </a:rPr>
+            <a:t>Obbiettivi</a:t>
+          </a:r>
+          <a:endParaRPr lang="en-US" sz="1800" kern="1200" dirty="0">
+            <a:solidFill>
+              <a:schemeClr val="tx1"/>
+            </a:solidFill>
+          </a:endParaRPr>
+        </a:p>
+      </dsp:txBody>
+      <dsp:txXfrm>
+        <a:off x="4156568" y="5650358"/>
+        <a:ext cx="1822808" cy="766831"/>
       </dsp:txXfrm>
     </dsp:sp>
   </dsp:spTree>
@@ -28210,7 +28844,7 @@
             <p:ph idx="1"/>
             <p:extLst>
               <p:ext uri="{D42A27DB-BD31-4B8C-83A1-F6EECF244321}">
-                <p14:modId xmlns:p14="http://schemas.microsoft.com/office/powerpoint/2010/main" val="2239481960"/>
+                <p14:modId xmlns:p14="http://schemas.microsoft.com/office/powerpoint/2010/main" val="3427349579"/>
               </p:ext>
             </p:extLst>
           </p:nvPr>

</xml_diff>